<commit_message>
Refresh the repository and update for day 2
</commit_message>
<xml_diff>
--- a/Day1/IntroToPython.pptx
+++ b/Day1/IntroToPython.pptx
@@ -5,7 +5,7 @@
     <p:sldMasterId id="2147483648" r:id="rId1"/>
   </p:sldMasterIdLst>
   <p:notesMasterIdLst>
-    <p:notesMasterId r:id="rId42"/>
+    <p:notesMasterId r:id="rId35"/>
   </p:notesMasterIdLst>
   <p:sldIdLst>
     <p:sldId id="256" r:id="rId2"/>
@@ -41,13 +41,6 @@
     <p:sldId id="273" r:id="rId32"/>
     <p:sldId id="294" r:id="rId33"/>
     <p:sldId id="293" r:id="rId34"/>
-    <p:sldId id="274" r:id="rId35"/>
-    <p:sldId id="275" r:id="rId36"/>
-    <p:sldId id="295" r:id="rId37"/>
-    <p:sldId id="282" r:id="rId38"/>
-    <p:sldId id="297" r:id="rId39"/>
-    <p:sldId id="296" r:id="rId40"/>
-    <p:sldId id="298" r:id="rId41"/>
   </p:sldIdLst>
   <p:sldSz cx="12192000" cy="6858000"/>
   <p:notesSz cx="6858000" cy="9144000"/>
@@ -1536,592 +1529,6 @@
       <dsp:cNvGrpSpPr/>
     </dsp:nvGrpSpPr>
     <dsp:grpSpPr/>
-    <dsp:sp modelId="{CEC1B8EA-340A-445A-9DC9-37D40C323C3F}">
-      <dsp:nvSpPr>
-        <dsp:cNvPr id="0" name=""/>
-        <dsp:cNvSpPr/>
-      </dsp:nvSpPr>
-      <dsp:spPr>
-        <a:xfrm rot="5400000">
-          <a:off x="-270253" y="273234"/>
-          <a:ext cx="1801692" cy="1261185"/>
-        </a:xfrm>
-        <a:prstGeom prst="chevron">
-          <a:avLst/>
-        </a:prstGeom>
-        <a:solidFill>
-          <a:schemeClr val="accent1">
-            <a:hueOff val="0"/>
-            <a:satOff val="0"/>
-            <a:lumOff val="0"/>
-            <a:alphaOff val="0"/>
-          </a:schemeClr>
-        </a:solidFill>
-        <a:ln w="12700" cap="flat" cmpd="sng" algn="ctr">
-          <a:solidFill>
-            <a:schemeClr val="accent1">
-              <a:hueOff val="0"/>
-              <a:satOff val="0"/>
-              <a:lumOff val="0"/>
-              <a:alphaOff val="0"/>
-            </a:schemeClr>
-          </a:solidFill>
-          <a:prstDash val="solid"/>
-          <a:miter lim="800000"/>
-        </a:ln>
-        <a:effectLst/>
-      </dsp:spPr>
-      <dsp:style>
-        <a:lnRef idx="2">
-          <a:scrgbClr r="0" g="0" b="0"/>
-        </a:lnRef>
-        <a:fillRef idx="1">
-          <a:scrgbClr r="0" g="0" b="0"/>
-        </a:fillRef>
-        <a:effectRef idx="0">
-          <a:scrgbClr r="0" g="0" b="0"/>
-        </a:effectRef>
-        <a:fontRef idx="minor">
-          <a:schemeClr val="lt1"/>
-        </a:fontRef>
-      </dsp:style>
-      <dsp:txBody>
-        <a:bodyPr spcFirstLastPara="0" vert="horz" wrap="square" lIns="11430" tIns="11430" rIns="11430" bIns="11430" numCol="1" spcCol="1270" anchor="ctr" anchorCtr="0">
-          <a:noAutofit/>
-        </a:bodyPr>
-        <a:lstStyle/>
-        <a:p>
-          <a:pPr lvl="0" algn="ctr" defTabSz="800100">
-            <a:lnSpc>
-              <a:spcPct val="90000"/>
-            </a:lnSpc>
-            <a:spcBef>
-              <a:spcPct val="0"/>
-            </a:spcBef>
-            <a:spcAft>
-              <a:spcPct val="35000"/>
-            </a:spcAft>
-          </a:pPr>
-          <a:r>
-            <a:rPr lang="en-US" sz="1800" kern="1200" dirty="0" smtClean="0"/>
-            <a:t>Shell</a:t>
-          </a:r>
-          <a:endParaRPr lang="en-US" sz="1800" kern="1200" dirty="0"/>
-        </a:p>
-      </dsp:txBody>
-      <dsp:txXfrm rot="-5400000">
-        <a:off x="1" y="633574"/>
-        <a:ext cx="1261185" cy="540507"/>
-      </dsp:txXfrm>
-    </dsp:sp>
-    <dsp:sp modelId="{CFDD388E-8449-4438-BAD4-7C6E4D7D8B06}">
-      <dsp:nvSpPr>
-        <dsp:cNvPr id="0" name=""/>
-        <dsp:cNvSpPr/>
-      </dsp:nvSpPr>
-      <dsp:spPr>
-        <a:xfrm rot="5400000">
-          <a:off x="3926967" y="-2662801"/>
-          <a:ext cx="1171100" cy="6502664"/>
-        </a:xfrm>
-        <a:prstGeom prst="round2SameRect">
-          <a:avLst/>
-        </a:prstGeom>
-        <a:solidFill>
-          <a:schemeClr val="lt1">
-            <a:alpha val="90000"/>
-            <a:hueOff val="0"/>
-            <a:satOff val="0"/>
-            <a:lumOff val="0"/>
-            <a:alphaOff val="0"/>
-          </a:schemeClr>
-        </a:solidFill>
-        <a:ln w="12700" cap="flat" cmpd="sng" algn="ctr">
-          <a:solidFill>
-            <a:schemeClr val="accent1">
-              <a:hueOff val="0"/>
-              <a:satOff val="0"/>
-              <a:lumOff val="0"/>
-              <a:alphaOff val="0"/>
-            </a:schemeClr>
-          </a:solidFill>
-          <a:prstDash val="solid"/>
-          <a:miter lim="800000"/>
-        </a:ln>
-        <a:effectLst/>
-      </dsp:spPr>
-      <dsp:style>
-        <a:lnRef idx="2">
-          <a:scrgbClr r="0" g="0" b="0"/>
-        </a:lnRef>
-        <a:fillRef idx="1">
-          <a:scrgbClr r="0" g="0" b="0"/>
-        </a:fillRef>
-        <a:effectRef idx="0">
-          <a:scrgbClr r="0" g="0" b="0"/>
-        </a:effectRef>
-        <a:fontRef idx="minor"/>
-      </dsp:style>
-      <dsp:txBody>
-        <a:bodyPr spcFirstLastPara="0" vert="horz" wrap="square" lIns="156464" tIns="13970" rIns="13970" bIns="13970" numCol="1" spcCol="1270" anchor="ctr" anchorCtr="0">
-          <a:noAutofit/>
-        </a:bodyPr>
-        <a:lstStyle/>
-        <a:p>
-          <a:pPr marL="228600" lvl="1" indent="-228600" algn="l" defTabSz="977900">
-            <a:lnSpc>
-              <a:spcPct val="90000"/>
-            </a:lnSpc>
-            <a:spcBef>
-              <a:spcPct val="0"/>
-            </a:spcBef>
-            <a:spcAft>
-              <a:spcPct val="15000"/>
-            </a:spcAft>
-            <a:buChar char="••"/>
-          </a:pPr>
-          <a:r>
-            <a:rPr lang="en-US" sz="2200" kern="1200" dirty="0" smtClean="0"/>
-            <a:t>Personally, rarely used</a:t>
-          </a:r>
-          <a:endParaRPr lang="en-US" sz="2200" kern="1200" dirty="0"/>
-        </a:p>
-        <a:p>
-          <a:pPr marL="228600" lvl="1" indent="-228600" algn="l" defTabSz="977900">
-            <a:lnSpc>
-              <a:spcPct val="90000"/>
-            </a:lnSpc>
-            <a:spcBef>
-              <a:spcPct val="0"/>
-            </a:spcBef>
-            <a:spcAft>
-              <a:spcPct val="15000"/>
-            </a:spcAft>
-            <a:buChar char="••"/>
-          </a:pPr>
-          <a:r>
-            <a:rPr lang="en-US" sz="2200" kern="1200" dirty="0" smtClean="0"/>
-            <a:t>Testing things out</a:t>
-          </a:r>
-          <a:endParaRPr lang="en-US" sz="2200" kern="1200" dirty="0"/>
-        </a:p>
-        <a:p>
-          <a:pPr marL="228600" lvl="1" indent="-228600" algn="l" defTabSz="977900">
-            <a:lnSpc>
-              <a:spcPct val="90000"/>
-            </a:lnSpc>
-            <a:spcBef>
-              <a:spcPct val="0"/>
-            </a:spcBef>
-            <a:spcAft>
-              <a:spcPct val="15000"/>
-            </a:spcAft>
-            <a:buChar char="••"/>
-          </a:pPr>
-          <a:r>
-            <a:rPr lang="en-US" sz="2200" kern="1200" dirty="0" smtClean="0"/>
-            <a:t>Debugging</a:t>
-          </a:r>
-          <a:endParaRPr lang="en-US" sz="2200" kern="1200" dirty="0"/>
-        </a:p>
-      </dsp:txBody>
-      <dsp:txXfrm rot="-5400000">
-        <a:off x="1261185" y="60149"/>
-        <a:ext cx="6445496" cy="1056764"/>
-      </dsp:txXfrm>
-    </dsp:sp>
-    <dsp:sp modelId="{5EBCA018-F934-4593-BA73-5F5F573330C7}">
-      <dsp:nvSpPr>
-        <dsp:cNvPr id="0" name=""/>
-        <dsp:cNvSpPr/>
-      </dsp:nvSpPr>
-      <dsp:spPr>
-        <a:xfrm rot="5400000">
-          <a:off x="-270253" y="1882940"/>
-          <a:ext cx="1801692" cy="1261185"/>
-        </a:xfrm>
-        <a:prstGeom prst="chevron">
-          <a:avLst/>
-        </a:prstGeom>
-        <a:solidFill>
-          <a:schemeClr val="accent1">
-            <a:hueOff val="0"/>
-            <a:satOff val="0"/>
-            <a:lumOff val="0"/>
-            <a:alphaOff val="0"/>
-          </a:schemeClr>
-        </a:solidFill>
-        <a:ln w="12700" cap="flat" cmpd="sng" algn="ctr">
-          <a:solidFill>
-            <a:schemeClr val="accent1">
-              <a:hueOff val="0"/>
-              <a:satOff val="0"/>
-              <a:lumOff val="0"/>
-              <a:alphaOff val="0"/>
-            </a:schemeClr>
-          </a:solidFill>
-          <a:prstDash val="solid"/>
-          <a:miter lim="800000"/>
-        </a:ln>
-        <a:effectLst/>
-      </dsp:spPr>
-      <dsp:style>
-        <a:lnRef idx="2">
-          <a:scrgbClr r="0" g="0" b="0"/>
-        </a:lnRef>
-        <a:fillRef idx="1">
-          <a:scrgbClr r="0" g="0" b="0"/>
-        </a:fillRef>
-        <a:effectRef idx="0">
-          <a:scrgbClr r="0" g="0" b="0"/>
-        </a:effectRef>
-        <a:fontRef idx="minor">
-          <a:schemeClr val="lt1"/>
-        </a:fontRef>
-      </dsp:style>
-      <dsp:txBody>
-        <a:bodyPr spcFirstLastPara="0" vert="horz" wrap="square" lIns="11430" tIns="11430" rIns="11430" bIns="11430" numCol="1" spcCol="1270" anchor="ctr" anchorCtr="0">
-          <a:noAutofit/>
-        </a:bodyPr>
-        <a:lstStyle/>
-        <a:p>
-          <a:pPr lvl="0" algn="ctr" defTabSz="800100">
-            <a:lnSpc>
-              <a:spcPct val="90000"/>
-            </a:lnSpc>
-            <a:spcBef>
-              <a:spcPct val="0"/>
-            </a:spcBef>
-            <a:spcAft>
-              <a:spcPct val="35000"/>
-            </a:spcAft>
-          </a:pPr>
-          <a:r>
-            <a:rPr lang="en-US" sz="1800" kern="1200" dirty="0" err="1" smtClean="0"/>
-            <a:t>Jupyter</a:t>
-          </a:r>
-          <a:r>
-            <a:rPr lang="en-US" sz="1800" kern="1200" dirty="0" smtClean="0"/>
-            <a:t> Notebook</a:t>
-          </a:r>
-          <a:endParaRPr lang="en-US" sz="1800" kern="1200" dirty="0"/>
-        </a:p>
-      </dsp:txBody>
-      <dsp:txXfrm rot="-5400000">
-        <a:off x="1" y="2243280"/>
-        <a:ext cx="1261185" cy="540507"/>
-      </dsp:txXfrm>
-    </dsp:sp>
-    <dsp:sp modelId="{CAE9CAE6-2E5D-469F-9DD2-1B33EF89E26C}">
-      <dsp:nvSpPr>
-        <dsp:cNvPr id="0" name=""/>
-        <dsp:cNvSpPr/>
-      </dsp:nvSpPr>
-      <dsp:spPr>
-        <a:xfrm rot="5400000">
-          <a:off x="3926967" y="-1053095"/>
-          <a:ext cx="1171100" cy="6502664"/>
-        </a:xfrm>
-        <a:prstGeom prst="round2SameRect">
-          <a:avLst/>
-        </a:prstGeom>
-        <a:solidFill>
-          <a:schemeClr val="lt1">
-            <a:alpha val="90000"/>
-            <a:hueOff val="0"/>
-            <a:satOff val="0"/>
-            <a:lumOff val="0"/>
-            <a:alphaOff val="0"/>
-          </a:schemeClr>
-        </a:solidFill>
-        <a:ln w="12700" cap="flat" cmpd="sng" algn="ctr">
-          <a:solidFill>
-            <a:schemeClr val="accent1">
-              <a:hueOff val="0"/>
-              <a:satOff val="0"/>
-              <a:lumOff val="0"/>
-              <a:alphaOff val="0"/>
-            </a:schemeClr>
-          </a:solidFill>
-          <a:prstDash val="solid"/>
-          <a:miter lim="800000"/>
-        </a:ln>
-        <a:effectLst/>
-      </dsp:spPr>
-      <dsp:style>
-        <a:lnRef idx="2">
-          <a:scrgbClr r="0" g="0" b="0"/>
-        </a:lnRef>
-        <a:fillRef idx="1">
-          <a:scrgbClr r="0" g="0" b="0"/>
-        </a:fillRef>
-        <a:effectRef idx="0">
-          <a:scrgbClr r="0" g="0" b="0"/>
-        </a:effectRef>
-        <a:fontRef idx="minor"/>
-      </dsp:style>
-      <dsp:txBody>
-        <a:bodyPr spcFirstLastPara="0" vert="horz" wrap="square" lIns="156464" tIns="13970" rIns="13970" bIns="13970" numCol="1" spcCol="1270" anchor="ctr" anchorCtr="0">
-          <a:noAutofit/>
-        </a:bodyPr>
-        <a:lstStyle/>
-        <a:p>
-          <a:pPr marL="228600" lvl="1" indent="-228600" algn="l" defTabSz="977900">
-            <a:lnSpc>
-              <a:spcPct val="90000"/>
-            </a:lnSpc>
-            <a:spcBef>
-              <a:spcPct val="0"/>
-            </a:spcBef>
-            <a:spcAft>
-              <a:spcPct val="15000"/>
-            </a:spcAft>
-            <a:buChar char="••"/>
-          </a:pPr>
-          <a:r>
-            <a:rPr lang="en-US" sz="2200" kern="1200" dirty="0" smtClean="0"/>
-            <a:t>Personally, mostly used</a:t>
-          </a:r>
-          <a:endParaRPr lang="en-US" sz="2200" kern="1200" dirty="0"/>
-        </a:p>
-        <a:p>
-          <a:pPr marL="228600" lvl="1" indent="-228600" algn="l" defTabSz="977900">
-            <a:lnSpc>
-              <a:spcPct val="90000"/>
-            </a:lnSpc>
-            <a:spcBef>
-              <a:spcPct val="0"/>
-            </a:spcBef>
-            <a:spcAft>
-              <a:spcPct val="15000"/>
-            </a:spcAft>
-            <a:buChar char="••"/>
-          </a:pPr>
-          <a:r>
-            <a:rPr lang="en-US" sz="2200" kern="1200" dirty="0" smtClean="0"/>
-            <a:t>Interact with data and document work</a:t>
-          </a:r>
-          <a:endParaRPr lang="en-US" sz="2200" kern="1200" dirty="0"/>
-        </a:p>
-        <a:p>
-          <a:pPr marL="228600" lvl="1" indent="-228600" algn="l" defTabSz="977900">
-            <a:lnSpc>
-              <a:spcPct val="90000"/>
-            </a:lnSpc>
-            <a:spcBef>
-              <a:spcPct val="0"/>
-            </a:spcBef>
-            <a:spcAft>
-              <a:spcPct val="15000"/>
-            </a:spcAft>
-            <a:buChar char="••"/>
-          </a:pPr>
-          <a:r>
-            <a:rPr lang="en-US" sz="2200" kern="1200" dirty="0" smtClean="0"/>
-            <a:t>Share with others</a:t>
-          </a:r>
-          <a:endParaRPr lang="en-US" sz="2200" kern="1200" dirty="0"/>
-        </a:p>
-      </dsp:txBody>
-      <dsp:txXfrm rot="-5400000">
-        <a:off x="1261185" y="1669855"/>
-        <a:ext cx="6445496" cy="1056764"/>
-      </dsp:txXfrm>
-    </dsp:sp>
-    <dsp:sp modelId="{4D29504E-A7BA-489A-B889-9C65D8487F1C}">
-      <dsp:nvSpPr>
-        <dsp:cNvPr id="0" name=""/>
-        <dsp:cNvSpPr/>
-      </dsp:nvSpPr>
-      <dsp:spPr>
-        <a:xfrm rot="5400000">
-          <a:off x="-270253" y="3492647"/>
-          <a:ext cx="1801692" cy="1261185"/>
-        </a:xfrm>
-        <a:prstGeom prst="chevron">
-          <a:avLst/>
-        </a:prstGeom>
-        <a:solidFill>
-          <a:schemeClr val="accent1">
-            <a:hueOff val="0"/>
-            <a:satOff val="0"/>
-            <a:lumOff val="0"/>
-            <a:alphaOff val="0"/>
-          </a:schemeClr>
-        </a:solidFill>
-        <a:ln w="12700" cap="flat" cmpd="sng" algn="ctr">
-          <a:solidFill>
-            <a:schemeClr val="accent1">
-              <a:hueOff val="0"/>
-              <a:satOff val="0"/>
-              <a:lumOff val="0"/>
-              <a:alphaOff val="0"/>
-            </a:schemeClr>
-          </a:solidFill>
-          <a:prstDash val="solid"/>
-          <a:miter lim="800000"/>
-        </a:ln>
-        <a:effectLst/>
-      </dsp:spPr>
-      <dsp:style>
-        <a:lnRef idx="2">
-          <a:scrgbClr r="0" g="0" b="0"/>
-        </a:lnRef>
-        <a:fillRef idx="1">
-          <a:scrgbClr r="0" g="0" b="0"/>
-        </a:fillRef>
-        <a:effectRef idx="0">
-          <a:scrgbClr r="0" g="0" b="0"/>
-        </a:effectRef>
-        <a:fontRef idx="minor">
-          <a:schemeClr val="lt1"/>
-        </a:fontRef>
-      </dsp:style>
-      <dsp:txBody>
-        <a:bodyPr spcFirstLastPara="0" vert="horz" wrap="square" lIns="11430" tIns="11430" rIns="11430" bIns="11430" numCol="1" spcCol="1270" anchor="ctr" anchorCtr="0">
-          <a:noAutofit/>
-        </a:bodyPr>
-        <a:lstStyle/>
-        <a:p>
-          <a:pPr lvl="0" algn="ctr" defTabSz="800100">
-            <a:lnSpc>
-              <a:spcPct val="90000"/>
-            </a:lnSpc>
-            <a:spcBef>
-              <a:spcPct val="0"/>
-            </a:spcBef>
-            <a:spcAft>
-              <a:spcPct val="35000"/>
-            </a:spcAft>
-          </a:pPr>
-          <a:r>
-            <a:rPr lang="en-US" sz="1800" kern="1200" dirty="0" smtClean="0"/>
-            <a:t>Editor</a:t>
-          </a:r>
-          <a:endParaRPr lang="en-US" sz="1800" kern="1200" dirty="0"/>
-        </a:p>
-      </dsp:txBody>
-      <dsp:txXfrm rot="-5400000">
-        <a:off x="1" y="3852987"/>
-        <a:ext cx="1261185" cy="540507"/>
-      </dsp:txXfrm>
-    </dsp:sp>
-    <dsp:sp modelId="{DF262737-312D-483F-BA76-ED92FFF56B21}">
-      <dsp:nvSpPr>
-        <dsp:cNvPr id="0" name=""/>
-        <dsp:cNvSpPr/>
-      </dsp:nvSpPr>
-      <dsp:spPr>
-        <a:xfrm rot="5400000">
-          <a:off x="3926967" y="556610"/>
-          <a:ext cx="1171100" cy="6502664"/>
-        </a:xfrm>
-        <a:prstGeom prst="round2SameRect">
-          <a:avLst/>
-        </a:prstGeom>
-        <a:solidFill>
-          <a:schemeClr val="lt1">
-            <a:alpha val="90000"/>
-            <a:hueOff val="0"/>
-            <a:satOff val="0"/>
-            <a:lumOff val="0"/>
-            <a:alphaOff val="0"/>
-          </a:schemeClr>
-        </a:solidFill>
-        <a:ln w="12700" cap="flat" cmpd="sng" algn="ctr">
-          <a:solidFill>
-            <a:schemeClr val="accent1">
-              <a:hueOff val="0"/>
-              <a:satOff val="0"/>
-              <a:lumOff val="0"/>
-              <a:alphaOff val="0"/>
-            </a:schemeClr>
-          </a:solidFill>
-          <a:prstDash val="solid"/>
-          <a:miter lim="800000"/>
-        </a:ln>
-        <a:effectLst/>
-      </dsp:spPr>
-      <dsp:style>
-        <a:lnRef idx="2">
-          <a:scrgbClr r="0" g="0" b="0"/>
-        </a:lnRef>
-        <a:fillRef idx="1">
-          <a:scrgbClr r="0" g="0" b="0"/>
-        </a:fillRef>
-        <a:effectRef idx="0">
-          <a:scrgbClr r="0" g="0" b="0"/>
-        </a:effectRef>
-        <a:fontRef idx="minor"/>
-      </dsp:style>
-      <dsp:txBody>
-        <a:bodyPr spcFirstLastPara="0" vert="horz" wrap="square" lIns="156464" tIns="13970" rIns="13970" bIns="13970" numCol="1" spcCol="1270" anchor="ctr" anchorCtr="0">
-          <a:noAutofit/>
-        </a:bodyPr>
-        <a:lstStyle/>
-        <a:p>
-          <a:pPr marL="228600" lvl="1" indent="-228600" algn="l" defTabSz="977900">
-            <a:lnSpc>
-              <a:spcPct val="90000"/>
-            </a:lnSpc>
-            <a:spcBef>
-              <a:spcPct val="0"/>
-            </a:spcBef>
-            <a:spcAft>
-              <a:spcPct val="15000"/>
-            </a:spcAft>
-            <a:buChar char="••"/>
-          </a:pPr>
-          <a:r>
-            <a:rPr lang="en-US" sz="2200" kern="1200" dirty="0" smtClean="0"/>
-            <a:t>Developing full application</a:t>
-          </a:r>
-          <a:endParaRPr lang="en-US" sz="2200" kern="1200" dirty="0"/>
-        </a:p>
-        <a:p>
-          <a:pPr marL="228600" lvl="1" indent="-228600" algn="l" defTabSz="977900">
-            <a:lnSpc>
-              <a:spcPct val="90000"/>
-            </a:lnSpc>
-            <a:spcBef>
-              <a:spcPct val="0"/>
-            </a:spcBef>
-            <a:spcAft>
-              <a:spcPct val="15000"/>
-            </a:spcAft>
-            <a:buChar char="••"/>
-          </a:pPr>
-          <a:r>
-            <a:rPr lang="en-US" sz="2200" kern="1200" dirty="0" smtClean="0"/>
-            <a:t>Organize multiple files</a:t>
-          </a:r>
-          <a:endParaRPr lang="en-US" sz="2200" kern="1200" dirty="0"/>
-        </a:p>
-        <a:p>
-          <a:pPr marL="228600" lvl="1" indent="-228600" algn="l" defTabSz="977900">
-            <a:lnSpc>
-              <a:spcPct val="90000"/>
-            </a:lnSpc>
-            <a:spcBef>
-              <a:spcPct val="0"/>
-            </a:spcBef>
-            <a:spcAft>
-              <a:spcPct val="15000"/>
-            </a:spcAft>
-            <a:buChar char="••"/>
-          </a:pPr>
-          <a:r>
-            <a:rPr lang="en-US" sz="2200" kern="1200" dirty="0" smtClean="0"/>
-            <a:t>Robust debugging and variable tracking</a:t>
-          </a:r>
-          <a:endParaRPr lang="en-US" sz="2200" kern="1200" dirty="0"/>
-        </a:p>
-      </dsp:txBody>
-      <dsp:txXfrm rot="-5400000">
-        <a:off x="1261185" y="3279560"/>
-        <a:ext cx="6445496" cy="1056764"/>
-      </dsp:txXfrm>
-    </dsp:sp>
   </dsp:spTree>
 </dsp:drawing>
 </file>
@@ -3858,107 +3265,6 @@
     <p:extLst>
       <p:ext uri="{BB962C8B-B14F-4D97-AF65-F5344CB8AC3E}">
         <p14:creationId xmlns:p14="http://schemas.microsoft.com/office/powerpoint/2010/main" val="3392741994"/>
-      </p:ext>
-    </p:extLst>
-  </p:cSld>
-  <p:clrMapOvr>
-    <a:masterClrMapping/>
-  </p:clrMapOvr>
-</p:notes>
-</file>
-
-<file path=ppt/notesSlides/notesSlide2.xml><?xml version="1.0" encoding="utf-8"?>
-<p:notes xmlns:a="http://schemas.openxmlformats.org/drawingml/2006/main" xmlns:r="http://schemas.openxmlformats.org/officeDocument/2006/relationships" xmlns:p="http://schemas.openxmlformats.org/presentationml/2006/main">
-  <p:cSld>
-    <p:spTree>
-      <p:nvGrpSpPr>
-        <p:cNvPr id="1" name=""/>
-        <p:cNvGrpSpPr/>
-        <p:nvPr/>
-      </p:nvGrpSpPr>
-      <p:grpSpPr>
-        <a:xfrm>
-          <a:off x="0" y="0"/>
-          <a:ext cx="0" cy="0"/>
-          <a:chOff x="0" y="0"/>
-          <a:chExt cx="0" cy="0"/>
-        </a:xfrm>
-      </p:grpSpPr>
-      <p:sp>
-        <p:nvSpPr>
-          <p:cNvPr id="2" name="Slide Image Placeholder 1"/>
-          <p:cNvSpPr>
-            <a:spLocks noGrp="1" noRot="1" noChangeAspect="1"/>
-          </p:cNvSpPr>
-          <p:nvPr>
-            <p:ph type="sldImg"/>
-          </p:nvPr>
-        </p:nvSpPr>
-        <p:spPr/>
-      </p:sp>
-      <p:sp>
-        <p:nvSpPr>
-          <p:cNvPr id="3" name="Notes Placeholder 2"/>
-          <p:cNvSpPr>
-            <a:spLocks noGrp="1"/>
-          </p:cNvSpPr>
-          <p:nvPr>
-            <p:ph type="body" idx="1"/>
-          </p:nvPr>
-        </p:nvSpPr>
-        <p:spPr/>
-        <p:txBody>
-          <a:bodyPr/>
-          <a:lstStyle/>
-          <a:p>
-            <a:r>
-              <a:rPr lang="en-US" dirty="0" smtClean="0"/>
-              <a:t>Any new methodology requires</a:t>
-            </a:r>
-            <a:r>
-              <a:rPr lang="en-US" baseline="0" dirty="0" smtClean="0"/>
-              <a:t> activation energy. Our goal is to only have this activation energy take place once, as a company. </a:t>
-            </a:r>
-          </a:p>
-          <a:p>
-            <a:endParaRPr lang="en-US" baseline="0" dirty="0" smtClean="0"/>
-          </a:p>
-          <a:p>
-            <a:r>
-              <a:rPr lang="en-US" baseline="0" dirty="0" smtClean="0"/>
-              <a:t>Dividends will pay off down the road</a:t>
-            </a:r>
-            <a:endParaRPr lang="en-US" dirty="0"/>
-          </a:p>
-        </p:txBody>
-      </p:sp>
-      <p:sp>
-        <p:nvSpPr>
-          <p:cNvPr id="4" name="Slide Number Placeholder 3"/>
-          <p:cNvSpPr>
-            <a:spLocks noGrp="1"/>
-          </p:cNvSpPr>
-          <p:nvPr>
-            <p:ph type="sldNum" sz="quarter" idx="10"/>
-          </p:nvPr>
-        </p:nvSpPr>
-        <p:spPr/>
-        <p:txBody>
-          <a:bodyPr/>
-          <a:lstStyle/>
-          <a:p>
-            <a:fld id="{BB6189AB-52EC-49B8-B495-010E12EA520B}" type="slidenum">
-              <a:rPr lang="en-US" smtClean="0"/>
-              <a:t>38</a:t>
-            </a:fld>
-            <a:endParaRPr lang="en-US"/>
-          </a:p>
-        </p:txBody>
-      </p:sp>
-    </p:spTree>
-    <p:extLst>
-      <p:ext uri="{BB962C8B-B14F-4D97-AF65-F5344CB8AC3E}">
-        <p14:creationId xmlns:p14="http://schemas.microsoft.com/office/powerpoint/2010/main" val="2851616102"/>
       </p:ext>
     </p:extLst>
   </p:cSld>
@@ -6876,15 +6182,7 @@
           <a:p>
             <a:r>
               <a:rPr lang="en-US" dirty="0" smtClean="0"/>
-              <a:t>April </a:t>
-            </a:r>
-            <a:r>
-              <a:rPr lang="en-US" dirty="0" smtClean="0"/>
-              <a:t>23-24, </a:t>
-            </a:r>
-            <a:r>
-              <a:rPr lang="en-US" dirty="0" smtClean="0"/>
-              <a:t>2018</a:t>
+              <a:t>April 23-24, 2018</a:t>
             </a:r>
             <a:endParaRPr lang="en-US" dirty="0"/>
           </a:p>
@@ -7829,25 +7127,8 @@
                   </a:schemeClr>
                 </a:solidFill>
               </a:rPr>
-              <a:t>print(“print me</a:t>
-            </a:r>
-            <a:r>
-              <a:rPr lang="en-US" dirty="0" smtClean="0">
-                <a:solidFill>
-                  <a:schemeClr val="accent2">
-                    <a:lumMod val="75000"/>
-                  </a:schemeClr>
-                </a:solidFill>
-              </a:rPr>
-              <a:t>”) </a:t>
-            </a:r>
-            <a:endParaRPr lang="en-US" dirty="0" smtClean="0">
-              <a:solidFill>
-                <a:schemeClr val="accent2">
-                  <a:lumMod val="75000"/>
-                </a:schemeClr>
-              </a:solidFill>
-            </a:endParaRPr>
+              <a:t>print(“print me”) </a:t>
+            </a:r>
           </a:p>
         </p:txBody>
       </p:sp>
@@ -9759,13 +9040,8 @@
           <a:p>
             <a:r>
               <a:rPr lang="en-US" dirty="0" smtClean="0"/>
-              <a:t>Click on </a:t>
-            </a:r>
-            <a:r>
-              <a:rPr lang="en-US" dirty="0" smtClean="0"/>
-              <a:t>Python-Data-Analysis-Course</a:t>
-            </a:r>
-            <a:endParaRPr lang="en-US" dirty="0" smtClean="0"/>
+              <a:t>Click on Python-Data-Analysis-Course</a:t>
+            </a:r>
           </a:p>
           <a:p>
             <a:r>
@@ -10427,13 +9703,8 @@
           <a:p>
             <a:r>
               <a:rPr lang="en-US" dirty="0" smtClean="0"/>
-              <a:t>Python code typically run from command </a:t>
-            </a:r>
-            <a:r>
-              <a:rPr lang="en-US" dirty="0" smtClean="0"/>
-              <a:t>line or within editor</a:t>
-            </a:r>
-            <a:endParaRPr lang="en-US" dirty="0" smtClean="0"/>
+              <a:t>Python code typically run from command line or within editor</a:t>
+            </a:r>
           </a:p>
           <a:p>
             <a:r>
@@ -12107,15 +11378,7 @@
           <a:p>
             <a:r>
               <a:rPr lang="en-US" dirty="0" smtClean="0"/>
-              <a:t>Open command line in the </a:t>
-            </a:r>
-            <a:r>
-              <a:rPr lang="en-US" dirty="0" smtClean="0"/>
-              <a:t>following </a:t>
-            </a:r>
-            <a:r>
-              <a:rPr lang="en-US" dirty="0" smtClean="0"/>
-              <a:t>folder on your computer</a:t>
+              <a:t>Open command line in the following folder on your computer</a:t>
             </a:r>
           </a:p>
           <a:p>
@@ -12125,13 +11388,8 @@
             </a:r>
             <a:r>
               <a:rPr lang="en-US" dirty="0" smtClean="0"/>
-              <a:t>:\...\</a:t>
-            </a:r>
-            <a:r>
-              <a:rPr lang="en-US" dirty="0" smtClean="0"/>
-              <a:t>Python-Data-Analysis-Course\notebooks</a:t>
-            </a:r>
-            <a:endParaRPr lang="en-US" dirty="0" smtClean="0"/>
+              <a:t>:\...\Python-Data-Analysis-Course\notebooks</a:t>
+            </a:r>
           </a:p>
           <a:p>
             <a:r>
@@ -12148,13 +11406,7 @@
               <a:rPr lang="en-US" dirty="0" smtClean="0">
                 <a:latin typeface="Consolas" panose="020B0609020204030204" pitchFamily="49" charset="0"/>
               </a:rPr>
-              <a:t> </a:t>
-            </a:r>
-            <a:r>
-              <a:rPr lang="en-US" dirty="0" smtClean="0">
-                <a:latin typeface="Consolas" panose="020B0609020204030204" pitchFamily="49" charset="0"/>
-              </a:rPr>
-              <a:t>notebook</a:t>
+              <a:t> notebook</a:t>
             </a:r>
           </a:p>
           <a:p>
@@ -12290,9 +11542,10 @@
           </a:p>
           <a:p>
             <a:r>
-              <a:rPr lang="en-US" dirty="0" smtClean="0"/>
-              <a:t>Streaming data streams</a:t>
-            </a:r>
+              <a:rPr lang="en-US" smtClean="0"/>
+              <a:t>Streaming data</a:t>
+            </a:r>
+            <a:endParaRPr lang="en-US" dirty="0" smtClean="0"/>
           </a:p>
           <a:p>
             <a:r>
@@ -13259,2200 +12512,6 @@
 </p:sld>
 </file>
 
-<file path=ppt/slides/slide34.xml><?xml version="1.0" encoding="utf-8"?>
-<p:sld xmlns:a="http://schemas.openxmlformats.org/drawingml/2006/main" xmlns:r="http://schemas.openxmlformats.org/officeDocument/2006/relationships" xmlns:p="http://schemas.openxmlformats.org/presentationml/2006/main">
-  <p:cSld>
-    <p:spTree>
-      <p:nvGrpSpPr>
-        <p:cNvPr id="1" name=""/>
-        <p:cNvGrpSpPr/>
-        <p:nvPr/>
-      </p:nvGrpSpPr>
-      <p:grpSpPr>
-        <a:xfrm>
-          <a:off x="0" y="0"/>
-          <a:ext cx="0" cy="0"/>
-          <a:chOff x="0" y="0"/>
-          <a:chExt cx="0" cy="0"/>
-        </a:xfrm>
-      </p:grpSpPr>
-      <p:sp>
-        <p:nvSpPr>
-          <p:cNvPr id="2" name="Title 1"/>
-          <p:cNvSpPr>
-            <a:spLocks noGrp="1"/>
-          </p:cNvSpPr>
-          <p:nvPr>
-            <p:ph type="title"/>
-          </p:nvPr>
-        </p:nvSpPr>
-        <p:spPr/>
-        <p:txBody>
-          <a:bodyPr/>
-          <a:lstStyle/>
-          <a:p>
-            <a:r>
-              <a:rPr lang="en-US" dirty="0" smtClean="0"/>
-              <a:t>Case Study</a:t>
-            </a:r>
-            <a:endParaRPr lang="en-US" dirty="0"/>
-          </a:p>
-        </p:txBody>
-      </p:sp>
-      <p:sp>
-        <p:nvSpPr>
-          <p:cNvPr id="3" name="Content Placeholder 2"/>
-          <p:cNvSpPr>
-            <a:spLocks noGrp="1"/>
-          </p:cNvSpPr>
-          <p:nvPr>
-            <p:ph idx="1"/>
-          </p:nvPr>
-        </p:nvSpPr>
-        <p:spPr>
-          <a:xfrm>
-            <a:off x="838200" y="1825625"/>
-            <a:ext cx="10515600" cy="1577051"/>
-          </a:xfrm>
-        </p:spPr>
-        <p:txBody>
-          <a:bodyPr/>
-          <a:lstStyle/>
-          <a:p>
-            <a:r>
-              <a:rPr lang="en-US" dirty="0" smtClean="0"/>
-              <a:t>You are compiling and analyzing flow data from a network of sewer meters.</a:t>
-            </a:r>
-          </a:p>
-          <a:p>
-            <a:r>
-              <a:rPr lang="en-US" dirty="0" smtClean="0"/>
-              <a:t>Date | Time | Location | Flow</a:t>
-            </a:r>
-          </a:p>
-        </p:txBody>
-      </p:sp>
-      <p:sp>
-        <p:nvSpPr>
-          <p:cNvPr id="4" name="TextBox 3"/>
-          <p:cNvSpPr txBox="1"/>
-          <p:nvPr/>
-        </p:nvSpPr>
-        <p:spPr>
-          <a:xfrm rot="20414145">
-            <a:off x="1919650" y="649913"/>
-            <a:ext cx="3612792" cy="1569660"/>
-          </a:xfrm>
-          <a:prstGeom prst="rect">
-            <a:avLst/>
-          </a:prstGeom>
-          <a:noFill/>
-        </p:spPr>
-        <p:txBody>
-          <a:bodyPr wrap="square" rtlCol="0">
-            <a:spAutoFit/>
-          </a:bodyPr>
-          <a:lstStyle/>
-          <a:p>
-            <a:pPr algn="ctr"/>
-            <a:r>
-              <a:rPr lang="en-US" sz="4800" b="1" dirty="0" smtClean="0">
-                <a:solidFill>
-                  <a:srgbClr val="FF0000"/>
-                </a:solidFill>
-                <a:latin typeface="Showcard Gothic" panose="04020904020102020604" pitchFamily="82" charset="0"/>
-              </a:rPr>
-              <a:t>HORROR </a:t>
-            </a:r>
-          </a:p>
-          <a:p>
-            <a:pPr algn="ctr"/>
-            <a:r>
-              <a:rPr lang="en-US" sz="4800" b="1" dirty="0" smtClean="0">
-                <a:solidFill>
-                  <a:srgbClr val="FF0000"/>
-                </a:solidFill>
-                <a:latin typeface="Showcard Gothic" panose="04020904020102020604" pitchFamily="82" charset="0"/>
-              </a:rPr>
-              <a:t>STORY</a:t>
-            </a:r>
-            <a:endParaRPr lang="en-US" sz="4800" b="1" dirty="0">
-              <a:solidFill>
-                <a:srgbClr val="FF0000"/>
-              </a:solidFill>
-              <a:latin typeface="Showcard Gothic" panose="04020904020102020604" pitchFamily="82" charset="0"/>
-            </a:endParaRPr>
-          </a:p>
-        </p:txBody>
-      </p:sp>
-      <p:sp>
-        <p:nvSpPr>
-          <p:cNvPr id="5" name="Content Placeholder 2"/>
-          <p:cNvSpPr txBox="1">
-            <a:spLocks/>
-          </p:cNvSpPr>
-          <p:nvPr/>
-        </p:nvSpPr>
-        <p:spPr>
-          <a:xfrm>
-            <a:off x="838200" y="3457691"/>
-            <a:ext cx="10515600" cy="2375073"/>
-          </a:xfrm>
-          <a:prstGeom prst="rect">
-            <a:avLst/>
-          </a:prstGeom>
-        </p:spPr>
-        <p:txBody>
-          <a:bodyPr vert="horz" lIns="91440" tIns="45720" rIns="91440" bIns="45720" rtlCol="0">
-            <a:normAutofit/>
-          </a:bodyPr>
-          <a:lstStyle>
-            <a:lvl1pPr marL="228600" indent="-228600" algn="l" defTabSz="914400" rtl="0" eaLnBrk="1" latinLnBrk="0" hangingPunct="1">
-              <a:lnSpc>
-                <a:spcPct val="90000"/>
-              </a:lnSpc>
-              <a:spcBef>
-                <a:spcPts val="1000"/>
-              </a:spcBef>
-              <a:buFont typeface="Arial" panose="020B0604020202020204" pitchFamily="34" charset="0"/>
-              <a:buChar char="•"/>
-              <a:defRPr sz="2800" kern="1200">
-                <a:solidFill>
-                  <a:schemeClr val="tx1"/>
-                </a:solidFill>
-                <a:latin typeface="+mn-lt"/>
-                <a:ea typeface="+mn-ea"/>
-                <a:cs typeface="+mn-cs"/>
-              </a:defRPr>
-            </a:lvl1pPr>
-            <a:lvl2pPr marL="685800" indent="-228600" algn="l" defTabSz="914400" rtl="0" eaLnBrk="1" latinLnBrk="0" hangingPunct="1">
-              <a:lnSpc>
-                <a:spcPct val="90000"/>
-              </a:lnSpc>
-              <a:spcBef>
-                <a:spcPts val="500"/>
-              </a:spcBef>
-              <a:buFont typeface="Arial" panose="020B0604020202020204" pitchFamily="34" charset="0"/>
-              <a:buChar char="•"/>
-              <a:defRPr sz="2400" kern="1200">
-                <a:solidFill>
-                  <a:schemeClr val="tx1"/>
-                </a:solidFill>
-                <a:latin typeface="+mn-lt"/>
-                <a:ea typeface="+mn-ea"/>
-                <a:cs typeface="+mn-cs"/>
-              </a:defRPr>
-            </a:lvl2pPr>
-            <a:lvl3pPr marL="1143000" indent="-228600" algn="l" defTabSz="914400" rtl="0" eaLnBrk="1" latinLnBrk="0" hangingPunct="1">
-              <a:lnSpc>
-                <a:spcPct val="90000"/>
-              </a:lnSpc>
-              <a:spcBef>
-                <a:spcPts val="500"/>
-              </a:spcBef>
-              <a:buFont typeface="Arial" panose="020B0604020202020204" pitchFamily="34" charset="0"/>
-              <a:buChar char="•"/>
-              <a:defRPr sz="2000" kern="1200">
-                <a:solidFill>
-                  <a:schemeClr val="tx1"/>
-                </a:solidFill>
-                <a:latin typeface="+mn-lt"/>
-                <a:ea typeface="+mn-ea"/>
-                <a:cs typeface="+mn-cs"/>
-              </a:defRPr>
-            </a:lvl3pPr>
-            <a:lvl4pPr marL="1600200" indent="-228600" algn="l" defTabSz="914400" rtl="0" eaLnBrk="1" latinLnBrk="0" hangingPunct="1">
-              <a:lnSpc>
-                <a:spcPct val="90000"/>
-              </a:lnSpc>
-              <a:spcBef>
-                <a:spcPts val="500"/>
-              </a:spcBef>
-              <a:buFont typeface="Arial" panose="020B0604020202020204" pitchFamily="34" charset="0"/>
-              <a:buChar char="•"/>
-              <a:defRPr sz="1800" kern="1200">
-                <a:solidFill>
-                  <a:schemeClr val="tx1"/>
-                </a:solidFill>
-                <a:latin typeface="+mn-lt"/>
-                <a:ea typeface="+mn-ea"/>
-                <a:cs typeface="+mn-cs"/>
-              </a:defRPr>
-            </a:lvl4pPr>
-            <a:lvl5pPr marL="2057400" indent="-228600" algn="l" defTabSz="914400" rtl="0" eaLnBrk="1" latinLnBrk="0" hangingPunct="1">
-              <a:lnSpc>
-                <a:spcPct val="90000"/>
-              </a:lnSpc>
-              <a:spcBef>
-                <a:spcPts val="500"/>
-              </a:spcBef>
-              <a:buFont typeface="Arial" panose="020B0604020202020204" pitchFamily="34" charset="0"/>
-              <a:buChar char="•"/>
-              <a:defRPr sz="1800" kern="1200">
-                <a:solidFill>
-                  <a:schemeClr val="tx1"/>
-                </a:solidFill>
-                <a:latin typeface="+mn-lt"/>
-                <a:ea typeface="+mn-ea"/>
-                <a:cs typeface="+mn-cs"/>
-              </a:defRPr>
-            </a:lvl5pPr>
-            <a:lvl6pPr marL="2514600" indent="-228600" algn="l" defTabSz="914400" rtl="0" eaLnBrk="1" latinLnBrk="0" hangingPunct="1">
-              <a:lnSpc>
-                <a:spcPct val="90000"/>
-              </a:lnSpc>
-              <a:spcBef>
-                <a:spcPts val="500"/>
-              </a:spcBef>
-              <a:buFont typeface="Arial" panose="020B0604020202020204" pitchFamily="34" charset="0"/>
-              <a:buChar char="•"/>
-              <a:defRPr sz="1800" kern="1200">
-                <a:solidFill>
-                  <a:schemeClr val="tx1"/>
-                </a:solidFill>
-                <a:latin typeface="+mn-lt"/>
-                <a:ea typeface="+mn-ea"/>
-                <a:cs typeface="+mn-cs"/>
-              </a:defRPr>
-            </a:lvl6pPr>
-            <a:lvl7pPr marL="2971800" indent="-228600" algn="l" defTabSz="914400" rtl="0" eaLnBrk="1" latinLnBrk="0" hangingPunct="1">
-              <a:lnSpc>
-                <a:spcPct val="90000"/>
-              </a:lnSpc>
-              <a:spcBef>
-                <a:spcPts val="500"/>
-              </a:spcBef>
-              <a:buFont typeface="Arial" panose="020B0604020202020204" pitchFamily="34" charset="0"/>
-              <a:buChar char="•"/>
-              <a:defRPr sz="1800" kern="1200">
-                <a:solidFill>
-                  <a:schemeClr val="tx1"/>
-                </a:solidFill>
-                <a:latin typeface="+mn-lt"/>
-                <a:ea typeface="+mn-ea"/>
-                <a:cs typeface="+mn-cs"/>
-              </a:defRPr>
-            </a:lvl7pPr>
-            <a:lvl8pPr marL="3429000" indent="-228600" algn="l" defTabSz="914400" rtl="0" eaLnBrk="1" latinLnBrk="0" hangingPunct="1">
-              <a:lnSpc>
-                <a:spcPct val="90000"/>
-              </a:lnSpc>
-              <a:spcBef>
-                <a:spcPts val="500"/>
-              </a:spcBef>
-              <a:buFont typeface="Arial" panose="020B0604020202020204" pitchFamily="34" charset="0"/>
-              <a:buChar char="•"/>
-              <a:defRPr sz="1800" kern="1200">
-                <a:solidFill>
-                  <a:schemeClr val="tx1"/>
-                </a:solidFill>
-                <a:latin typeface="+mn-lt"/>
-                <a:ea typeface="+mn-ea"/>
-                <a:cs typeface="+mn-cs"/>
-              </a:defRPr>
-            </a:lvl8pPr>
-            <a:lvl9pPr marL="3886200" indent="-228600" algn="l" defTabSz="914400" rtl="0" eaLnBrk="1" latinLnBrk="0" hangingPunct="1">
-              <a:lnSpc>
-                <a:spcPct val="90000"/>
-              </a:lnSpc>
-              <a:spcBef>
-                <a:spcPts val="500"/>
-              </a:spcBef>
-              <a:buFont typeface="Arial" panose="020B0604020202020204" pitchFamily="34" charset="0"/>
-              <a:buChar char="•"/>
-              <a:defRPr sz="1800" kern="1200">
-                <a:solidFill>
-                  <a:schemeClr val="tx1"/>
-                </a:solidFill>
-                <a:latin typeface="+mn-lt"/>
-                <a:ea typeface="+mn-ea"/>
-                <a:cs typeface="+mn-cs"/>
-              </a:defRPr>
-            </a:lvl9pPr>
-          </a:lstStyle>
-          <a:p>
-            <a:r>
-              <a:rPr lang="en-US" dirty="0" smtClean="0"/>
-              <a:t>You receive 15 csv files, 2 text files, a pdf, and an Excel spreadsheet with “flow data”</a:t>
-            </a:r>
-          </a:p>
-          <a:p>
-            <a:r>
-              <a:rPr lang="en-US" dirty="0" smtClean="0"/>
-              <a:t>What do you do with it?</a:t>
-            </a:r>
-          </a:p>
-          <a:p>
-            <a:r>
-              <a:rPr lang="en-US" dirty="0" smtClean="0"/>
-              <a:t>What’s different if you are expecting the same batch of data every month?</a:t>
-            </a:r>
-          </a:p>
-        </p:txBody>
-      </p:sp>
-    </p:spTree>
-    <p:extLst>
-      <p:ext uri="{BB962C8B-B14F-4D97-AF65-F5344CB8AC3E}">
-        <p14:creationId xmlns:p14="http://schemas.microsoft.com/office/powerpoint/2010/main" val="1587825823"/>
-      </p:ext>
-    </p:extLst>
-  </p:cSld>
-  <p:clrMapOvr>
-    <a:masterClrMapping/>
-  </p:clrMapOvr>
-  <p:timing>
-    <p:tnLst>
-      <p:par>
-        <p:cTn id="1" dur="indefinite" restart="never" nodeType="tmRoot">
-          <p:childTnLst>
-            <p:seq concurrent="1" nextAc="seek">
-              <p:cTn id="2" dur="indefinite" nodeType="mainSeq">
-                <p:childTnLst>
-                  <p:par>
-                    <p:cTn id="3" fill="hold">
-                      <p:stCondLst>
-                        <p:cond delay="indefinite"/>
-                      </p:stCondLst>
-                      <p:childTnLst>
-                        <p:par>
-                          <p:cTn id="4" fill="hold">
-                            <p:stCondLst>
-                              <p:cond delay="0"/>
-                            </p:stCondLst>
-                            <p:childTnLst>
-                              <p:par>
-                                <p:cTn id="5" presetID="1" presetClass="entr" presetSubtype="0" fill="hold" grpId="0" nodeType="clickEffect">
-                                  <p:stCondLst>
-                                    <p:cond delay="0"/>
-                                  </p:stCondLst>
-                                  <p:childTnLst>
-                                    <p:set>
-                                      <p:cBhvr>
-                                        <p:cTn id="6" dur="1" fill="hold">
-                                          <p:stCondLst>
-                                            <p:cond delay="0"/>
-                                          </p:stCondLst>
-                                        </p:cTn>
-                                        <p:tgtEl>
-                                          <p:spTgt spid="3">
-                                            <p:txEl>
-                                              <p:pRg st="0" end="0"/>
-                                            </p:txEl>
-                                          </p:spTgt>
-                                        </p:tgtEl>
-                                        <p:attrNameLst>
-                                          <p:attrName>style.visibility</p:attrName>
-                                        </p:attrNameLst>
-                                      </p:cBhvr>
-                                      <p:to>
-                                        <p:strVal val="visible"/>
-                                      </p:to>
-                                    </p:set>
-                                  </p:childTnLst>
-                                </p:cTn>
-                              </p:par>
-                            </p:childTnLst>
-                          </p:cTn>
-                        </p:par>
-                      </p:childTnLst>
-                    </p:cTn>
-                  </p:par>
-                  <p:par>
-                    <p:cTn id="7" fill="hold">
-                      <p:stCondLst>
-                        <p:cond delay="indefinite"/>
-                      </p:stCondLst>
-                      <p:childTnLst>
-                        <p:par>
-                          <p:cTn id="8" fill="hold">
-                            <p:stCondLst>
-                              <p:cond delay="0"/>
-                            </p:stCondLst>
-                            <p:childTnLst>
-                              <p:par>
-                                <p:cTn id="9" presetID="1" presetClass="entr" presetSubtype="0" fill="hold" grpId="0" nodeType="clickEffect">
-                                  <p:stCondLst>
-                                    <p:cond delay="0"/>
-                                  </p:stCondLst>
-                                  <p:childTnLst>
-                                    <p:set>
-                                      <p:cBhvr>
-                                        <p:cTn id="10" dur="1" fill="hold">
-                                          <p:stCondLst>
-                                            <p:cond delay="0"/>
-                                          </p:stCondLst>
-                                        </p:cTn>
-                                        <p:tgtEl>
-                                          <p:spTgt spid="3">
-                                            <p:txEl>
-                                              <p:pRg st="1" end="1"/>
-                                            </p:txEl>
-                                          </p:spTgt>
-                                        </p:tgtEl>
-                                        <p:attrNameLst>
-                                          <p:attrName>style.visibility</p:attrName>
-                                        </p:attrNameLst>
-                                      </p:cBhvr>
-                                      <p:to>
-                                        <p:strVal val="visible"/>
-                                      </p:to>
-                                    </p:set>
-                                  </p:childTnLst>
-                                </p:cTn>
-                              </p:par>
-                            </p:childTnLst>
-                          </p:cTn>
-                        </p:par>
-                      </p:childTnLst>
-                    </p:cTn>
-                  </p:par>
-                  <p:par>
-                    <p:cTn id="11" fill="hold">
-                      <p:stCondLst>
-                        <p:cond delay="indefinite"/>
-                      </p:stCondLst>
-                      <p:childTnLst>
-                        <p:par>
-                          <p:cTn id="12" fill="hold">
-                            <p:stCondLst>
-                              <p:cond delay="0"/>
-                            </p:stCondLst>
-                            <p:childTnLst>
-                              <p:par>
-                                <p:cTn id="13" presetID="6" presetClass="entr" presetSubtype="16" fill="hold" grpId="0" nodeType="clickEffect">
-                                  <p:stCondLst>
-                                    <p:cond delay="0"/>
-                                  </p:stCondLst>
-                                  <p:childTnLst>
-                                    <p:set>
-                                      <p:cBhvr>
-                                        <p:cTn id="14" dur="1" fill="hold">
-                                          <p:stCondLst>
-                                            <p:cond delay="0"/>
-                                          </p:stCondLst>
-                                        </p:cTn>
-                                        <p:tgtEl>
-                                          <p:spTgt spid="4"/>
-                                        </p:tgtEl>
-                                        <p:attrNameLst>
-                                          <p:attrName>style.visibility</p:attrName>
-                                        </p:attrNameLst>
-                                      </p:cBhvr>
-                                      <p:to>
-                                        <p:strVal val="visible"/>
-                                      </p:to>
-                                    </p:set>
-                                    <p:animEffect transition="in" filter="circle(in)">
-                                      <p:cBhvr>
-                                        <p:cTn id="15" dur="2000"/>
-                                        <p:tgtEl>
-                                          <p:spTgt spid="4"/>
-                                        </p:tgtEl>
-                                      </p:cBhvr>
-                                    </p:animEffect>
-                                  </p:childTnLst>
-                                </p:cTn>
-                              </p:par>
-                              <p:par>
-                                <p:cTn id="16" presetID="1" presetClass="entr" presetSubtype="0" fill="hold" grpId="0" nodeType="withEffect">
-                                  <p:stCondLst>
-                                    <p:cond delay="0"/>
-                                  </p:stCondLst>
-                                  <p:childTnLst>
-                                    <p:set>
-                                      <p:cBhvr>
-                                        <p:cTn id="17" dur="1" fill="hold">
-                                          <p:stCondLst>
-                                            <p:cond delay="0"/>
-                                          </p:stCondLst>
-                                        </p:cTn>
-                                        <p:tgtEl>
-                                          <p:spTgt spid="5"/>
-                                        </p:tgtEl>
-                                        <p:attrNameLst>
-                                          <p:attrName>style.visibility</p:attrName>
-                                        </p:attrNameLst>
-                                      </p:cBhvr>
-                                      <p:to>
-                                        <p:strVal val="visible"/>
-                                      </p:to>
-                                    </p:set>
-                                  </p:childTnLst>
-                                </p:cTn>
-                              </p:par>
-                            </p:childTnLst>
-                          </p:cTn>
-                        </p:par>
-                      </p:childTnLst>
-                    </p:cTn>
-                  </p:par>
-                </p:childTnLst>
-              </p:cTn>
-              <p:prevCondLst>
-                <p:cond evt="onPrev" delay="0">
-                  <p:tgtEl>
-                    <p:sldTgt/>
-                  </p:tgtEl>
-                </p:cond>
-              </p:prevCondLst>
-              <p:nextCondLst>
-                <p:cond evt="onNext" delay="0">
-                  <p:tgtEl>
-                    <p:sldTgt/>
-                  </p:tgtEl>
-                </p:cond>
-              </p:nextCondLst>
-            </p:seq>
-          </p:childTnLst>
-        </p:cTn>
-      </p:par>
-    </p:tnLst>
-    <p:bldLst>
-      <p:bldP spid="3" grpId="0" build="p"/>
-      <p:bldP spid="4" grpId="0"/>
-      <p:bldP spid="5" grpId="0"/>
-    </p:bldLst>
-  </p:timing>
-</p:sld>
-</file>
-
-<file path=ppt/slides/slide35.xml><?xml version="1.0" encoding="utf-8"?>
-<p:sld xmlns:a="http://schemas.openxmlformats.org/drawingml/2006/main" xmlns:r="http://schemas.openxmlformats.org/officeDocument/2006/relationships" xmlns:p="http://schemas.openxmlformats.org/presentationml/2006/main">
-  <p:cSld>
-    <p:spTree>
-      <p:nvGrpSpPr>
-        <p:cNvPr id="1" name=""/>
-        <p:cNvGrpSpPr/>
-        <p:nvPr/>
-      </p:nvGrpSpPr>
-      <p:grpSpPr>
-        <a:xfrm>
-          <a:off x="0" y="0"/>
-          <a:ext cx="0" cy="0"/>
-          <a:chOff x="0" y="0"/>
-          <a:chExt cx="0" cy="0"/>
-        </a:xfrm>
-      </p:grpSpPr>
-      <p:pic>
-        <p:nvPicPr>
-          <p:cNvPr id="1026" name="Picture 2" descr="Image result for python vs. r"/>
-          <p:cNvPicPr>
-            <a:picLocks noGrp="1" noChangeAspect="1" noChangeArrowheads="1"/>
-          </p:cNvPicPr>
-          <p:nvPr>
-            <p:ph idx="1"/>
-          </p:nvPr>
-        </p:nvPicPr>
-        <p:blipFill>
-          <a:blip r:embed="rId2">
-            <a:extLst>
-              <a:ext uri="{28A0092B-C50C-407E-A947-70E740481C1C}">
-                <a14:useLocalDpi xmlns:a14="http://schemas.microsoft.com/office/drawing/2010/main" val="0"/>
-              </a:ext>
-            </a:extLst>
-          </a:blip>
-          <a:srcRect/>
-          <a:stretch>
-            <a:fillRect/>
-          </a:stretch>
-        </p:blipFill>
-        <p:spPr bwMode="auto">
-          <a:xfrm>
-            <a:off x="1429586" y="925483"/>
-            <a:ext cx="9451774" cy="4725887"/>
-          </a:xfrm>
-          <a:prstGeom prst="rect">
-            <a:avLst/>
-          </a:prstGeom>
-          <a:noFill/>
-          <a:extLst>
-            <a:ext uri="{909E8E84-426E-40DD-AFC4-6F175D3DCCD1}">
-              <a14:hiddenFill xmlns:a14="http://schemas.microsoft.com/office/drawing/2010/main">
-                <a:solidFill>
-                  <a:srgbClr val="FFFFFF"/>
-                </a:solidFill>
-              </a14:hiddenFill>
-            </a:ext>
-          </a:extLst>
-        </p:spPr>
-      </p:pic>
-    </p:spTree>
-    <p:extLst>
-      <p:ext uri="{BB962C8B-B14F-4D97-AF65-F5344CB8AC3E}">
-        <p14:creationId xmlns:p14="http://schemas.microsoft.com/office/powerpoint/2010/main" val="1027691194"/>
-      </p:ext>
-    </p:extLst>
-  </p:cSld>
-  <p:clrMapOvr>
-    <a:masterClrMapping/>
-  </p:clrMapOvr>
-  <p:timing>
-    <p:tnLst>
-      <p:par>
-        <p:cTn id="1" dur="indefinite" restart="never" nodeType="tmRoot"/>
-      </p:par>
-    </p:tnLst>
-  </p:timing>
-</p:sld>
-</file>
-
-<file path=ppt/slides/slide36.xml><?xml version="1.0" encoding="utf-8"?>
-<p:sld xmlns:a="http://schemas.openxmlformats.org/drawingml/2006/main" xmlns:r="http://schemas.openxmlformats.org/officeDocument/2006/relationships" xmlns:p="http://schemas.openxmlformats.org/presentationml/2006/main">
-  <p:cSld>
-    <p:spTree>
-      <p:nvGrpSpPr>
-        <p:cNvPr id="1" name=""/>
-        <p:cNvGrpSpPr/>
-        <p:nvPr/>
-      </p:nvGrpSpPr>
-      <p:grpSpPr>
-        <a:xfrm>
-          <a:off x="0" y="0"/>
-          <a:ext cx="0" cy="0"/>
-          <a:chOff x="0" y="0"/>
-          <a:chExt cx="0" cy="0"/>
-        </a:xfrm>
-      </p:grpSpPr>
-      <p:sp>
-        <p:nvSpPr>
-          <p:cNvPr id="3" name="Content Placeholder 2"/>
-          <p:cNvSpPr>
-            <a:spLocks noGrp="1"/>
-          </p:cNvSpPr>
-          <p:nvPr>
-            <p:ph idx="1"/>
-          </p:nvPr>
-        </p:nvSpPr>
-        <p:spPr>
-          <a:xfrm>
-            <a:off x="838200" y="853440"/>
-            <a:ext cx="10515600" cy="5323523"/>
-          </a:xfrm>
-        </p:spPr>
-        <p:txBody>
-          <a:bodyPr/>
-          <a:lstStyle/>
-          <a:p>
-            <a:r>
-              <a:rPr lang="en-US" dirty="0" smtClean="0"/>
-              <a:t>R</a:t>
-            </a:r>
-          </a:p>
-          <a:p>
-            <a:pPr lvl="1"/>
-            <a:r>
-              <a:rPr lang="en-US" dirty="0" smtClean="0"/>
-              <a:t>Programming language created by statisticians and mathematicians</a:t>
-            </a:r>
-          </a:p>
-          <a:p>
-            <a:pPr lvl="1"/>
-            <a:r>
-              <a:rPr lang="en-US" dirty="0" smtClean="0"/>
-              <a:t>Huge library of statistical and modeling functions</a:t>
-            </a:r>
-          </a:p>
-          <a:p>
-            <a:pPr lvl="1"/>
-            <a:r>
-              <a:rPr lang="en-US" dirty="0" smtClean="0"/>
-              <a:t>Great graphics support</a:t>
-            </a:r>
-          </a:p>
-          <a:p>
-            <a:pPr lvl="1"/>
-            <a:r>
-              <a:rPr lang="en-US" dirty="0" smtClean="0"/>
-              <a:t>Wide user community</a:t>
-            </a:r>
-          </a:p>
-          <a:p>
-            <a:r>
-              <a:rPr lang="en-US" dirty="0" smtClean="0"/>
-              <a:t>Python</a:t>
-            </a:r>
-          </a:p>
-          <a:p>
-            <a:pPr lvl="1"/>
-            <a:r>
-              <a:rPr lang="en-US" dirty="0" smtClean="0"/>
-              <a:t>Programming language named after Monty Python</a:t>
-            </a:r>
-          </a:p>
-          <a:p>
-            <a:pPr lvl="1"/>
-            <a:r>
-              <a:rPr lang="en-US" dirty="0" smtClean="0"/>
-              <a:t>More general purpose than R</a:t>
-            </a:r>
-          </a:p>
-          <a:p>
-            <a:pPr lvl="1"/>
-            <a:r>
-              <a:rPr lang="en-US" dirty="0" smtClean="0"/>
-              <a:t>Can be used for much more than data analysis</a:t>
-            </a:r>
-          </a:p>
-          <a:p>
-            <a:pPr lvl="1"/>
-            <a:r>
-              <a:rPr lang="en-US" dirty="0" smtClean="0"/>
-              <a:t>Great graphics support</a:t>
-            </a:r>
-          </a:p>
-          <a:p>
-            <a:pPr lvl="1"/>
-            <a:r>
-              <a:rPr lang="en-US" dirty="0" smtClean="0"/>
-              <a:t>With Pandas, puts it on a level playing field with R for data analysis</a:t>
-            </a:r>
-          </a:p>
-          <a:p>
-            <a:pPr lvl="1"/>
-            <a:r>
-              <a:rPr lang="en-US" dirty="0" smtClean="0"/>
-              <a:t>Wide user community</a:t>
-            </a:r>
-          </a:p>
-        </p:txBody>
-      </p:sp>
-    </p:spTree>
-    <p:extLst>
-      <p:ext uri="{BB962C8B-B14F-4D97-AF65-F5344CB8AC3E}">
-        <p14:creationId xmlns:p14="http://schemas.microsoft.com/office/powerpoint/2010/main" val="255219874"/>
-      </p:ext>
-    </p:extLst>
-  </p:cSld>
-  <p:clrMapOvr>
-    <a:masterClrMapping/>
-  </p:clrMapOvr>
-  <p:timing>
-    <p:tnLst>
-      <p:par>
-        <p:cTn id="1" dur="indefinite" restart="never" nodeType="tmRoot"/>
-      </p:par>
-    </p:tnLst>
-  </p:timing>
-</p:sld>
-</file>
-
-<file path=ppt/slides/slide37.xml><?xml version="1.0" encoding="utf-8"?>
-<p:sld xmlns:a="http://schemas.openxmlformats.org/drawingml/2006/main" xmlns:r="http://schemas.openxmlformats.org/officeDocument/2006/relationships" xmlns:p="http://schemas.openxmlformats.org/presentationml/2006/main">
-  <p:cSld>
-    <p:spTree>
-      <p:nvGrpSpPr>
-        <p:cNvPr id="1" name=""/>
-        <p:cNvGrpSpPr/>
-        <p:nvPr/>
-      </p:nvGrpSpPr>
-      <p:grpSpPr>
-        <a:xfrm>
-          <a:off x="0" y="0"/>
-          <a:ext cx="0" cy="0"/>
-          <a:chOff x="0" y="0"/>
-          <a:chExt cx="0" cy="0"/>
-        </a:xfrm>
-      </p:grpSpPr>
-      <p:sp>
-        <p:nvSpPr>
-          <p:cNvPr id="2" name="Title 1"/>
-          <p:cNvSpPr>
-            <a:spLocks noGrp="1"/>
-          </p:cNvSpPr>
-          <p:nvPr>
-            <p:ph type="title"/>
-          </p:nvPr>
-        </p:nvSpPr>
-        <p:spPr/>
-        <p:txBody>
-          <a:bodyPr/>
-          <a:lstStyle/>
-          <a:p>
-            <a:r>
-              <a:rPr lang="en-US" dirty="0" smtClean="0"/>
-              <a:t>The other tool…Excel</a:t>
-            </a:r>
-            <a:endParaRPr lang="en-US" dirty="0"/>
-          </a:p>
-        </p:txBody>
-      </p:sp>
-      <p:sp>
-        <p:nvSpPr>
-          <p:cNvPr id="3" name="Content Placeholder 2"/>
-          <p:cNvSpPr>
-            <a:spLocks noGrp="1"/>
-          </p:cNvSpPr>
-          <p:nvPr>
-            <p:ph idx="1"/>
-          </p:nvPr>
-        </p:nvSpPr>
-        <p:spPr/>
-        <p:txBody>
-          <a:bodyPr/>
-          <a:lstStyle/>
-          <a:p>
-            <a:r>
-              <a:rPr lang="en-US" dirty="0" smtClean="0"/>
-              <a:t>Used by consultants</a:t>
-            </a:r>
-          </a:p>
-          <a:p>
-            <a:r>
-              <a:rPr lang="en-US" dirty="0" smtClean="0"/>
-              <a:t>Great user interface</a:t>
-            </a:r>
-          </a:p>
-          <a:p>
-            <a:r>
-              <a:rPr lang="en-US" dirty="0" smtClean="0"/>
-              <a:t>Everybody has it</a:t>
-            </a:r>
-          </a:p>
-          <a:p>
-            <a:r>
-              <a:rPr lang="en-US" dirty="0" smtClean="0"/>
-              <a:t>Shallow learning curve</a:t>
-            </a:r>
-          </a:p>
-          <a:p>
-            <a:r>
-              <a:rPr lang="en-US" dirty="0" smtClean="0"/>
-              <a:t>Unstructured</a:t>
-            </a:r>
-          </a:p>
-          <a:p>
-            <a:pPr marL="457200" lvl="1" indent="0">
-              <a:buNone/>
-            </a:pPr>
-            <a:endParaRPr lang="en-US" dirty="0" smtClean="0"/>
-          </a:p>
-          <a:p>
-            <a:pPr lvl="1"/>
-            <a:endParaRPr lang="en-US" dirty="0" smtClean="0"/>
-          </a:p>
-          <a:p>
-            <a:endParaRPr lang="en-US" dirty="0" smtClean="0"/>
-          </a:p>
-          <a:p>
-            <a:endParaRPr lang="en-US" dirty="0"/>
-          </a:p>
-        </p:txBody>
-      </p:sp>
-      <p:sp>
-        <p:nvSpPr>
-          <p:cNvPr id="4" name="Content Placeholder 2"/>
-          <p:cNvSpPr txBox="1">
-            <a:spLocks/>
-          </p:cNvSpPr>
-          <p:nvPr/>
-        </p:nvSpPr>
-        <p:spPr>
-          <a:xfrm>
-            <a:off x="5285509" y="1825625"/>
-            <a:ext cx="10515600" cy="4351338"/>
-          </a:xfrm>
-          <a:prstGeom prst="rect">
-            <a:avLst/>
-          </a:prstGeom>
-        </p:spPr>
-        <p:txBody>
-          <a:bodyPr vert="horz" lIns="91440" tIns="45720" rIns="91440" bIns="45720" rtlCol="0">
-            <a:normAutofit/>
-          </a:bodyPr>
-          <a:lstStyle>
-            <a:lvl1pPr marL="228600" indent="-228600" algn="l" defTabSz="914400" rtl="0" eaLnBrk="1" latinLnBrk="0" hangingPunct="1">
-              <a:lnSpc>
-                <a:spcPct val="90000"/>
-              </a:lnSpc>
-              <a:spcBef>
-                <a:spcPts val="1000"/>
-              </a:spcBef>
-              <a:buFont typeface="Arial" panose="020B0604020202020204" pitchFamily="34" charset="0"/>
-              <a:buChar char="•"/>
-              <a:defRPr sz="2800" kern="1200">
-                <a:solidFill>
-                  <a:schemeClr val="tx1"/>
-                </a:solidFill>
-                <a:latin typeface="+mn-lt"/>
-                <a:ea typeface="+mn-ea"/>
-                <a:cs typeface="+mn-cs"/>
-              </a:defRPr>
-            </a:lvl1pPr>
-            <a:lvl2pPr marL="685800" indent="-228600" algn="l" defTabSz="914400" rtl="0" eaLnBrk="1" latinLnBrk="0" hangingPunct="1">
-              <a:lnSpc>
-                <a:spcPct val="90000"/>
-              </a:lnSpc>
-              <a:spcBef>
-                <a:spcPts val="500"/>
-              </a:spcBef>
-              <a:buFont typeface="Arial" panose="020B0604020202020204" pitchFamily="34" charset="0"/>
-              <a:buChar char="•"/>
-              <a:defRPr sz="2400" kern="1200">
-                <a:solidFill>
-                  <a:schemeClr val="tx1"/>
-                </a:solidFill>
-                <a:latin typeface="+mn-lt"/>
-                <a:ea typeface="+mn-ea"/>
-                <a:cs typeface="+mn-cs"/>
-              </a:defRPr>
-            </a:lvl2pPr>
-            <a:lvl3pPr marL="1143000" indent="-228600" algn="l" defTabSz="914400" rtl="0" eaLnBrk="1" latinLnBrk="0" hangingPunct="1">
-              <a:lnSpc>
-                <a:spcPct val="90000"/>
-              </a:lnSpc>
-              <a:spcBef>
-                <a:spcPts val="500"/>
-              </a:spcBef>
-              <a:buFont typeface="Arial" panose="020B0604020202020204" pitchFamily="34" charset="0"/>
-              <a:buChar char="•"/>
-              <a:defRPr sz="2000" kern="1200">
-                <a:solidFill>
-                  <a:schemeClr val="tx1"/>
-                </a:solidFill>
-                <a:latin typeface="+mn-lt"/>
-                <a:ea typeface="+mn-ea"/>
-                <a:cs typeface="+mn-cs"/>
-              </a:defRPr>
-            </a:lvl3pPr>
-            <a:lvl4pPr marL="1600200" indent="-228600" algn="l" defTabSz="914400" rtl="0" eaLnBrk="1" latinLnBrk="0" hangingPunct="1">
-              <a:lnSpc>
-                <a:spcPct val="90000"/>
-              </a:lnSpc>
-              <a:spcBef>
-                <a:spcPts val="500"/>
-              </a:spcBef>
-              <a:buFont typeface="Arial" panose="020B0604020202020204" pitchFamily="34" charset="0"/>
-              <a:buChar char="•"/>
-              <a:defRPr sz="1800" kern="1200">
-                <a:solidFill>
-                  <a:schemeClr val="tx1"/>
-                </a:solidFill>
-                <a:latin typeface="+mn-lt"/>
-                <a:ea typeface="+mn-ea"/>
-                <a:cs typeface="+mn-cs"/>
-              </a:defRPr>
-            </a:lvl4pPr>
-            <a:lvl5pPr marL="2057400" indent="-228600" algn="l" defTabSz="914400" rtl="0" eaLnBrk="1" latinLnBrk="0" hangingPunct="1">
-              <a:lnSpc>
-                <a:spcPct val="90000"/>
-              </a:lnSpc>
-              <a:spcBef>
-                <a:spcPts val="500"/>
-              </a:spcBef>
-              <a:buFont typeface="Arial" panose="020B0604020202020204" pitchFamily="34" charset="0"/>
-              <a:buChar char="•"/>
-              <a:defRPr sz="1800" kern="1200">
-                <a:solidFill>
-                  <a:schemeClr val="tx1"/>
-                </a:solidFill>
-                <a:latin typeface="+mn-lt"/>
-                <a:ea typeface="+mn-ea"/>
-                <a:cs typeface="+mn-cs"/>
-              </a:defRPr>
-            </a:lvl5pPr>
-            <a:lvl6pPr marL="2514600" indent="-228600" algn="l" defTabSz="914400" rtl="0" eaLnBrk="1" latinLnBrk="0" hangingPunct="1">
-              <a:lnSpc>
-                <a:spcPct val="90000"/>
-              </a:lnSpc>
-              <a:spcBef>
-                <a:spcPts val="500"/>
-              </a:spcBef>
-              <a:buFont typeface="Arial" panose="020B0604020202020204" pitchFamily="34" charset="0"/>
-              <a:buChar char="•"/>
-              <a:defRPr sz="1800" kern="1200">
-                <a:solidFill>
-                  <a:schemeClr val="tx1"/>
-                </a:solidFill>
-                <a:latin typeface="+mn-lt"/>
-                <a:ea typeface="+mn-ea"/>
-                <a:cs typeface="+mn-cs"/>
-              </a:defRPr>
-            </a:lvl6pPr>
-            <a:lvl7pPr marL="2971800" indent="-228600" algn="l" defTabSz="914400" rtl="0" eaLnBrk="1" latinLnBrk="0" hangingPunct="1">
-              <a:lnSpc>
-                <a:spcPct val="90000"/>
-              </a:lnSpc>
-              <a:spcBef>
-                <a:spcPts val="500"/>
-              </a:spcBef>
-              <a:buFont typeface="Arial" panose="020B0604020202020204" pitchFamily="34" charset="0"/>
-              <a:buChar char="•"/>
-              <a:defRPr sz="1800" kern="1200">
-                <a:solidFill>
-                  <a:schemeClr val="tx1"/>
-                </a:solidFill>
-                <a:latin typeface="+mn-lt"/>
-                <a:ea typeface="+mn-ea"/>
-                <a:cs typeface="+mn-cs"/>
-              </a:defRPr>
-            </a:lvl7pPr>
-            <a:lvl8pPr marL="3429000" indent="-228600" algn="l" defTabSz="914400" rtl="0" eaLnBrk="1" latinLnBrk="0" hangingPunct="1">
-              <a:lnSpc>
-                <a:spcPct val="90000"/>
-              </a:lnSpc>
-              <a:spcBef>
-                <a:spcPts val="500"/>
-              </a:spcBef>
-              <a:buFont typeface="Arial" panose="020B0604020202020204" pitchFamily="34" charset="0"/>
-              <a:buChar char="•"/>
-              <a:defRPr sz="1800" kern="1200">
-                <a:solidFill>
-                  <a:schemeClr val="tx1"/>
-                </a:solidFill>
-                <a:latin typeface="+mn-lt"/>
-                <a:ea typeface="+mn-ea"/>
-                <a:cs typeface="+mn-cs"/>
-              </a:defRPr>
-            </a:lvl8pPr>
-            <a:lvl9pPr marL="3886200" indent="-228600" algn="l" defTabSz="914400" rtl="0" eaLnBrk="1" latinLnBrk="0" hangingPunct="1">
-              <a:lnSpc>
-                <a:spcPct val="90000"/>
-              </a:lnSpc>
-              <a:spcBef>
-                <a:spcPts val="500"/>
-              </a:spcBef>
-              <a:buFont typeface="Arial" panose="020B0604020202020204" pitchFamily="34" charset="0"/>
-              <a:buChar char="•"/>
-              <a:defRPr sz="1800" kern="1200">
-                <a:solidFill>
-                  <a:schemeClr val="tx1"/>
-                </a:solidFill>
-                <a:latin typeface="+mn-lt"/>
-                <a:ea typeface="+mn-ea"/>
-                <a:cs typeface="+mn-cs"/>
-              </a:defRPr>
-            </a:lvl9pPr>
-          </a:lstStyle>
-          <a:p>
-            <a:r>
-              <a:rPr lang="en-US" dirty="0" smtClean="0"/>
-              <a:t>Non-linear setup</a:t>
-            </a:r>
-          </a:p>
-          <a:p>
-            <a:r>
-              <a:rPr lang="en-US" dirty="0" smtClean="0"/>
-              <a:t>Great for prototyping and one-off </a:t>
-            </a:r>
-            <a:r>
-              <a:rPr lang="en-US" dirty="0" err="1" smtClean="0"/>
-              <a:t>calcs</a:t>
-            </a:r>
-            <a:endParaRPr lang="en-US" dirty="0" smtClean="0"/>
-          </a:p>
-          <a:p>
-            <a:r>
-              <a:rPr lang="en-US" dirty="0" smtClean="0"/>
-              <a:t>Not most efficient for repetitive work</a:t>
-            </a:r>
-          </a:p>
-          <a:p>
-            <a:r>
-              <a:rPr lang="en-US" dirty="0" smtClean="0"/>
-              <a:t>Limited graphical capabilities</a:t>
-            </a:r>
-          </a:p>
-          <a:p>
-            <a:pPr marL="457200" lvl="1" indent="0">
-              <a:buFont typeface="Arial" panose="020B0604020202020204" pitchFamily="34" charset="0"/>
-              <a:buNone/>
-            </a:pPr>
-            <a:endParaRPr lang="en-US" dirty="0" smtClean="0"/>
-          </a:p>
-          <a:p>
-            <a:pPr lvl="1"/>
-            <a:endParaRPr lang="en-US" dirty="0" smtClean="0"/>
-          </a:p>
-          <a:p>
-            <a:endParaRPr lang="en-US" dirty="0" smtClean="0"/>
-          </a:p>
-          <a:p>
-            <a:endParaRPr lang="en-US" dirty="0"/>
-          </a:p>
-        </p:txBody>
-      </p:sp>
-    </p:spTree>
-    <p:extLst>
-      <p:ext uri="{BB962C8B-B14F-4D97-AF65-F5344CB8AC3E}">
-        <p14:creationId xmlns:p14="http://schemas.microsoft.com/office/powerpoint/2010/main" val="2649493265"/>
-      </p:ext>
-    </p:extLst>
-  </p:cSld>
-  <p:clrMapOvr>
-    <a:masterClrMapping/>
-  </p:clrMapOvr>
-  <p:timing>
-    <p:tnLst>
-      <p:par>
-        <p:cTn id="1" dur="indefinite" restart="never" nodeType="tmRoot"/>
-      </p:par>
-    </p:tnLst>
-  </p:timing>
-</p:sld>
-</file>
-
-<file path=ppt/slides/slide38.xml><?xml version="1.0" encoding="utf-8"?>
-<p:sld xmlns:a="http://schemas.openxmlformats.org/drawingml/2006/main" xmlns:r="http://schemas.openxmlformats.org/officeDocument/2006/relationships" xmlns:p="http://schemas.openxmlformats.org/presentationml/2006/main">
-  <p:cSld>
-    <p:spTree>
-      <p:nvGrpSpPr>
-        <p:cNvPr id="1" name=""/>
-        <p:cNvGrpSpPr/>
-        <p:nvPr/>
-      </p:nvGrpSpPr>
-      <p:grpSpPr>
-        <a:xfrm>
-          <a:off x="0" y="0"/>
-          <a:ext cx="0" cy="0"/>
-          <a:chOff x="0" y="0"/>
-          <a:chExt cx="0" cy="0"/>
-        </a:xfrm>
-      </p:grpSpPr>
-      <p:cxnSp>
-        <p:nvCxnSpPr>
-          <p:cNvPr id="6" name="Straight Arrow Connector 5"/>
-          <p:cNvCxnSpPr/>
-          <p:nvPr/>
-        </p:nvCxnSpPr>
-        <p:spPr>
-          <a:xfrm flipV="1">
-            <a:off x="1016000" y="745067"/>
-            <a:ext cx="0" cy="4656666"/>
-          </a:xfrm>
-          <a:prstGeom prst="straightConnector1">
-            <a:avLst/>
-          </a:prstGeom>
-          <a:ln>
-            <a:tailEnd type="triangle"/>
-          </a:ln>
-        </p:spPr>
-        <p:style>
-          <a:lnRef idx="1">
-            <a:schemeClr val="accent1"/>
-          </a:lnRef>
-          <a:fillRef idx="0">
-            <a:schemeClr val="accent1"/>
-          </a:fillRef>
-          <a:effectRef idx="0">
-            <a:schemeClr val="accent1"/>
-          </a:effectRef>
-          <a:fontRef idx="minor">
-            <a:schemeClr val="tx1"/>
-          </a:fontRef>
-        </p:style>
-      </p:cxnSp>
-      <p:cxnSp>
-        <p:nvCxnSpPr>
-          <p:cNvPr id="8" name="Straight Arrow Connector 7"/>
-          <p:cNvCxnSpPr/>
-          <p:nvPr/>
-        </p:nvCxnSpPr>
-        <p:spPr>
-          <a:xfrm>
-            <a:off x="1016000" y="5401733"/>
-            <a:ext cx="9237133" cy="0"/>
-          </a:xfrm>
-          <a:prstGeom prst="straightConnector1">
-            <a:avLst/>
-          </a:prstGeom>
-          <a:ln>
-            <a:tailEnd type="triangle"/>
-          </a:ln>
-        </p:spPr>
-        <p:style>
-          <a:lnRef idx="1">
-            <a:schemeClr val="accent1"/>
-          </a:lnRef>
-          <a:fillRef idx="0">
-            <a:schemeClr val="accent1"/>
-          </a:fillRef>
-          <a:effectRef idx="0">
-            <a:schemeClr val="accent1"/>
-          </a:effectRef>
-          <a:fontRef idx="minor">
-            <a:schemeClr val="tx1"/>
-          </a:fontRef>
-        </p:style>
-      </p:cxnSp>
-      <p:sp>
-        <p:nvSpPr>
-          <p:cNvPr id="9" name="Freeform 8"/>
-          <p:cNvSpPr/>
-          <p:nvPr/>
-        </p:nvSpPr>
-        <p:spPr>
-          <a:xfrm>
-            <a:off x="1032933" y="2324274"/>
-            <a:ext cx="9033934" cy="3077459"/>
-          </a:xfrm>
-          <a:custGeom>
-            <a:avLst/>
-            <a:gdLst>
-              <a:gd name="connsiteX0" fmla="*/ 0 w 9033934"/>
-              <a:gd name="connsiteY0" fmla="*/ 3077459 h 3077459"/>
-              <a:gd name="connsiteX1" fmla="*/ 397934 w 9033934"/>
-              <a:gd name="connsiteY1" fmla="*/ 2781126 h 3077459"/>
-              <a:gd name="connsiteX2" fmla="*/ 914400 w 9033934"/>
-              <a:gd name="connsiteY2" fmla="*/ 1824393 h 3077459"/>
-              <a:gd name="connsiteX3" fmla="*/ 1524000 w 9033934"/>
-              <a:gd name="connsiteY3" fmla="*/ 181859 h 3077459"/>
-              <a:gd name="connsiteX4" fmla="*/ 2429934 w 9033934"/>
-              <a:gd name="connsiteY4" fmla="*/ 266526 h 3077459"/>
-              <a:gd name="connsiteX5" fmla="*/ 3183467 w 9033934"/>
-              <a:gd name="connsiteY5" fmla="*/ 2188459 h 3077459"/>
-              <a:gd name="connsiteX6" fmla="*/ 5799667 w 9033934"/>
-              <a:gd name="connsiteY6" fmla="*/ 2798059 h 3077459"/>
-              <a:gd name="connsiteX7" fmla="*/ 9033934 w 9033934"/>
-              <a:gd name="connsiteY7" fmla="*/ 2933526 h 3077459"/>
-            </a:gdLst>
-            <a:ahLst/>
-            <a:cxnLst>
-              <a:cxn ang="0">
-                <a:pos x="connsiteX0" y="connsiteY0"/>
-              </a:cxn>
-              <a:cxn ang="0">
-                <a:pos x="connsiteX1" y="connsiteY1"/>
-              </a:cxn>
-              <a:cxn ang="0">
-                <a:pos x="connsiteX2" y="connsiteY2"/>
-              </a:cxn>
-              <a:cxn ang="0">
-                <a:pos x="connsiteX3" y="connsiteY3"/>
-              </a:cxn>
-              <a:cxn ang="0">
-                <a:pos x="connsiteX4" y="connsiteY4"/>
-              </a:cxn>
-              <a:cxn ang="0">
-                <a:pos x="connsiteX5" y="connsiteY5"/>
-              </a:cxn>
-              <a:cxn ang="0">
-                <a:pos x="connsiteX6" y="connsiteY6"/>
-              </a:cxn>
-              <a:cxn ang="0">
-                <a:pos x="connsiteX7" y="connsiteY7"/>
-              </a:cxn>
-            </a:cxnLst>
-            <a:rect l="l" t="t" r="r" b="b"/>
-            <a:pathLst>
-              <a:path w="9033934" h="3077459">
-                <a:moveTo>
-                  <a:pt x="0" y="3077459"/>
-                </a:moveTo>
-                <a:cubicBezTo>
-                  <a:pt x="122767" y="3033714"/>
-                  <a:pt x="245534" y="2989970"/>
-                  <a:pt x="397934" y="2781126"/>
-                </a:cubicBezTo>
-                <a:cubicBezTo>
-                  <a:pt x="550334" y="2572282"/>
-                  <a:pt x="726722" y="2257604"/>
-                  <a:pt x="914400" y="1824393"/>
-                </a:cubicBezTo>
-                <a:cubicBezTo>
-                  <a:pt x="1102078" y="1391182"/>
-                  <a:pt x="1271411" y="441503"/>
-                  <a:pt x="1524000" y="181859"/>
-                </a:cubicBezTo>
-                <a:cubicBezTo>
-                  <a:pt x="1776589" y="-77785"/>
-                  <a:pt x="2153356" y="-67907"/>
-                  <a:pt x="2429934" y="266526"/>
-                </a:cubicBezTo>
-                <a:cubicBezTo>
-                  <a:pt x="2706512" y="600959"/>
-                  <a:pt x="2621845" y="1766537"/>
-                  <a:pt x="3183467" y="2188459"/>
-                </a:cubicBezTo>
-                <a:cubicBezTo>
-                  <a:pt x="3745089" y="2610381"/>
-                  <a:pt x="4824589" y="2673881"/>
-                  <a:pt x="5799667" y="2798059"/>
-                </a:cubicBezTo>
-                <a:cubicBezTo>
-                  <a:pt x="6774745" y="2922237"/>
-                  <a:pt x="7904339" y="2927881"/>
-                  <a:pt x="9033934" y="2933526"/>
-                </a:cubicBezTo>
-              </a:path>
-            </a:pathLst>
-          </a:custGeom>
-          <a:noFill/>
-          <a:ln w="38100"/>
-        </p:spPr>
-        <p:style>
-          <a:lnRef idx="2">
-            <a:schemeClr val="accent1">
-              <a:shade val="50000"/>
-            </a:schemeClr>
-          </a:lnRef>
-          <a:fillRef idx="1">
-            <a:schemeClr val="accent1"/>
-          </a:fillRef>
-          <a:effectRef idx="0">
-            <a:schemeClr val="accent1"/>
-          </a:effectRef>
-          <a:fontRef idx="minor">
-            <a:schemeClr val="lt1"/>
-          </a:fontRef>
-        </p:style>
-        <p:txBody>
-          <a:bodyPr rtlCol="0" anchor="ctr"/>
-          <a:lstStyle/>
-          <a:p>
-            <a:pPr algn="ctr"/>
-            <a:endParaRPr lang="en-US"/>
-          </a:p>
-        </p:txBody>
-      </p:sp>
-      <p:sp>
-        <p:nvSpPr>
-          <p:cNvPr id="10" name="Freeform 9"/>
-          <p:cNvSpPr/>
-          <p:nvPr/>
-        </p:nvSpPr>
-        <p:spPr>
-          <a:xfrm>
-            <a:off x="1100667" y="4100252"/>
-            <a:ext cx="8864600" cy="1309948"/>
-          </a:xfrm>
-          <a:custGeom>
-            <a:avLst/>
-            <a:gdLst>
-              <a:gd name="connsiteX0" fmla="*/ 0 w 8940800"/>
-              <a:gd name="connsiteY0" fmla="*/ 1309948 h 1309948"/>
-              <a:gd name="connsiteX1" fmla="*/ 482600 w 8940800"/>
-              <a:gd name="connsiteY1" fmla="*/ 912015 h 1309948"/>
-              <a:gd name="connsiteX2" fmla="*/ 948266 w 8940800"/>
-              <a:gd name="connsiteY2" fmla="*/ 166948 h 1309948"/>
-              <a:gd name="connsiteX3" fmla="*/ 2438400 w 8940800"/>
-              <a:gd name="connsiteY3" fmla="*/ 14548 h 1309948"/>
-              <a:gd name="connsiteX4" fmla="*/ 4360333 w 8940800"/>
-              <a:gd name="connsiteY4" fmla="*/ 412481 h 1309948"/>
-              <a:gd name="connsiteX5" fmla="*/ 8940800 w 8940800"/>
-              <a:gd name="connsiteY5" fmla="*/ 564881 h 1309948"/>
-            </a:gdLst>
-            <a:ahLst/>
-            <a:cxnLst>
-              <a:cxn ang="0">
-                <a:pos x="connsiteX0" y="connsiteY0"/>
-              </a:cxn>
-              <a:cxn ang="0">
-                <a:pos x="connsiteX1" y="connsiteY1"/>
-              </a:cxn>
-              <a:cxn ang="0">
-                <a:pos x="connsiteX2" y="connsiteY2"/>
-              </a:cxn>
-              <a:cxn ang="0">
-                <a:pos x="connsiteX3" y="connsiteY3"/>
-              </a:cxn>
-              <a:cxn ang="0">
-                <a:pos x="connsiteX4" y="connsiteY4"/>
-              </a:cxn>
-              <a:cxn ang="0">
-                <a:pos x="connsiteX5" y="connsiteY5"/>
-              </a:cxn>
-            </a:cxnLst>
-            <a:rect l="l" t="t" r="r" b="b"/>
-            <a:pathLst>
-              <a:path w="8940800" h="1309948">
-                <a:moveTo>
-                  <a:pt x="0" y="1309948"/>
-                </a:moveTo>
-                <a:cubicBezTo>
-                  <a:pt x="162278" y="1206231"/>
-                  <a:pt x="324556" y="1102515"/>
-                  <a:pt x="482600" y="912015"/>
-                </a:cubicBezTo>
-                <a:cubicBezTo>
-                  <a:pt x="640644" y="721515"/>
-                  <a:pt x="622299" y="316526"/>
-                  <a:pt x="948266" y="166948"/>
-                </a:cubicBezTo>
-                <a:cubicBezTo>
-                  <a:pt x="1274233" y="17370"/>
-                  <a:pt x="1869722" y="-26374"/>
-                  <a:pt x="2438400" y="14548"/>
-                </a:cubicBezTo>
-                <a:cubicBezTo>
-                  <a:pt x="3007078" y="55470"/>
-                  <a:pt x="3276600" y="320759"/>
-                  <a:pt x="4360333" y="412481"/>
-                </a:cubicBezTo>
-                <a:cubicBezTo>
-                  <a:pt x="5444066" y="504203"/>
-                  <a:pt x="7192433" y="534542"/>
-                  <a:pt x="8940800" y="564881"/>
-                </a:cubicBezTo>
-              </a:path>
-            </a:pathLst>
-          </a:custGeom>
-          <a:noFill/>
-          <a:ln w="38100">
-            <a:solidFill>
-              <a:schemeClr val="accent2">
-                <a:lumMod val="75000"/>
-              </a:schemeClr>
-            </a:solidFill>
-          </a:ln>
-        </p:spPr>
-        <p:style>
-          <a:lnRef idx="2">
-            <a:schemeClr val="accent1">
-              <a:shade val="50000"/>
-            </a:schemeClr>
-          </a:lnRef>
-          <a:fillRef idx="1">
-            <a:schemeClr val="accent1"/>
-          </a:fillRef>
-          <a:effectRef idx="0">
-            <a:schemeClr val="accent1"/>
-          </a:effectRef>
-          <a:fontRef idx="minor">
-            <a:schemeClr val="lt1"/>
-          </a:fontRef>
-        </p:style>
-        <p:txBody>
-          <a:bodyPr rtlCol="0" anchor="ctr"/>
-          <a:lstStyle/>
-          <a:p>
-            <a:pPr algn="ctr"/>
-            <a:endParaRPr lang="en-US"/>
-          </a:p>
-        </p:txBody>
-      </p:sp>
-      <p:sp>
-        <p:nvSpPr>
-          <p:cNvPr id="11" name="TextBox 10"/>
-          <p:cNvSpPr txBox="1"/>
-          <p:nvPr/>
-        </p:nvSpPr>
-        <p:spPr>
-          <a:xfrm rot="16200000">
-            <a:off x="323689" y="2743200"/>
-            <a:ext cx="981423" cy="369332"/>
-          </a:xfrm>
-          <a:prstGeom prst="rect">
-            <a:avLst/>
-          </a:prstGeom>
-          <a:noFill/>
-        </p:spPr>
-        <p:txBody>
-          <a:bodyPr wrap="none" rtlCol="0">
-            <a:spAutoFit/>
-          </a:bodyPr>
-          <a:lstStyle/>
-          <a:p>
-            <a:r>
-              <a:rPr lang="en-US" dirty="0" smtClean="0"/>
-              <a:t>Effort </a:t>
-            </a:r>
-            <a:r>
-              <a:rPr lang="en-US" dirty="0" smtClean="0">
-                <a:sym typeface="Wingdings" panose="05000000000000000000" pitchFamily="2" charset="2"/>
-              </a:rPr>
-              <a:t></a:t>
-            </a:r>
-            <a:endParaRPr lang="en-US" dirty="0"/>
-          </a:p>
-        </p:txBody>
-      </p:sp>
-      <p:sp>
-        <p:nvSpPr>
-          <p:cNvPr id="12" name="TextBox 11"/>
-          <p:cNvSpPr txBox="1"/>
-          <p:nvPr/>
-        </p:nvSpPr>
-        <p:spPr>
-          <a:xfrm>
-            <a:off x="4455423" y="5477934"/>
-            <a:ext cx="2517805" cy="369332"/>
-          </a:xfrm>
-          <a:prstGeom prst="rect">
-            <a:avLst/>
-          </a:prstGeom>
-          <a:noFill/>
-        </p:spPr>
-        <p:txBody>
-          <a:bodyPr wrap="none" rtlCol="0">
-            <a:spAutoFit/>
-          </a:bodyPr>
-          <a:lstStyle/>
-          <a:p>
-            <a:r>
-              <a:rPr lang="en-US" dirty="0" smtClean="0"/>
-              <a:t>Progression of Project </a:t>
-            </a:r>
-            <a:r>
-              <a:rPr lang="en-US" dirty="0" smtClean="0">
-                <a:sym typeface="Wingdings" panose="05000000000000000000" pitchFamily="2" charset="2"/>
-              </a:rPr>
-              <a:t></a:t>
-            </a:r>
-            <a:endParaRPr lang="en-US" dirty="0"/>
-          </a:p>
-        </p:txBody>
-      </p:sp>
-      <p:sp>
-        <p:nvSpPr>
-          <p:cNvPr id="13" name="Oval 12"/>
-          <p:cNvSpPr/>
-          <p:nvPr/>
-        </p:nvSpPr>
-        <p:spPr>
-          <a:xfrm>
-            <a:off x="1930399" y="1327310"/>
-            <a:ext cx="2040467" cy="3911601"/>
-          </a:xfrm>
-          <a:prstGeom prst="ellipse">
-            <a:avLst/>
-          </a:prstGeom>
-          <a:noFill/>
-          <a:ln w="38100">
-            <a:solidFill>
-              <a:schemeClr val="bg1">
-                <a:lumMod val="65000"/>
-              </a:schemeClr>
-            </a:solidFill>
-            <a:prstDash val="sysDash"/>
-          </a:ln>
-        </p:spPr>
-        <p:style>
-          <a:lnRef idx="2">
-            <a:schemeClr val="accent1">
-              <a:shade val="50000"/>
-            </a:schemeClr>
-          </a:lnRef>
-          <a:fillRef idx="1">
-            <a:schemeClr val="accent1"/>
-          </a:fillRef>
-          <a:effectRef idx="0">
-            <a:schemeClr val="accent1"/>
-          </a:effectRef>
-          <a:fontRef idx="minor">
-            <a:schemeClr val="lt1"/>
-          </a:fontRef>
-        </p:style>
-        <p:txBody>
-          <a:bodyPr rtlCol="0" anchor="ctr"/>
-          <a:lstStyle/>
-          <a:p>
-            <a:pPr algn="ctr"/>
-            <a:endParaRPr lang="en-US"/>
-          </a:p>
-        </p:txBody>
-      </p:sp>
-      <p:sp>
-        <p:nvSpPr>
-          <p:cNvPr id="14" name="TextBox 13"/>
-          <p:cNvSpPr txBox="1"/>
-          <p:nvPr/>
-        </p:nvSpPr>
-        <p:spPr>
-          <a:xfrm>
-            <a:off x="2422795" y="949512"/>
-            <a:ext cx="1055674" cy="369332"/>
-          </a:xfrm>
-          <a:prstGeom prst="rect">
-            <a:avLst/>
-          </a:prstGeom>
-          <a:noFill/>
-        </p:spPr>
-        <p:txBody>
-          <a:bodyPr wrap="none" rtlCol="0">
-            <a:spAutoFit/>
-          </a:bodyPr>
-          <a:lstStyle/>
-          <a:p>
-            <a:r>
-              <a:rPr lang="en-US" dirty="0" smtClean="0"/>
-              <a:t>Adoption</a:t>
-            </a:r>
-            <a:endParaRPr lang="en-US" dirty="0"/>
-          </a:p>
-        </p:txBody>
-      </p:sp>
-      <p:sp>
-        <p:nvSpPr>
-          <p:cNvPr id="15" name="Oval 14"/>
-          <p:cNvSpPr/>
-          <p:nvPr/>
-        </p:nvSpPr>
-        <p:spPr>
-          <a:xfrm>
-            <a:off x="4944532" y="4334934"/>
-            <a:ext cx="6019801" cy="1109134"/>
-          </a:xfrm>
-          <a:prstGeom prst="ellipse">
-            <a:avLst/>
-          </a:prstGeom>
-          <a:noFill/>
-          <a:ln w="38100">
-            <a:solidFill>
-              <a:schemeClr val="bg1">
-                <a:lumMod val="65000"/>
-              </a:schemeClr>
-            </a:solidFill>
-            <a:prstDash val="sysDash"/>
-          </a:ln>
-        </p:spPr>
-        <p:style>
-          <a:lnRef idx="2">
-            <a:schemeClr val="accent1">
-              <a:shade val="50000"/>
-            </a:schemeClr>
-          </a:lnRef>
-          <a:fillRef idx="1">
-            <a:schemeClr val="accent1"/>
-          </a:fillRef>
-          <a:effectRef idx="0">
-            <a:schemeClr val="accent1"/>
-          </a:effectRef>
-          <a:fontRef idx="minor">
-            <a:schemeClr val="lt1"/>
-          </a:fontRef>
-        </p:style>
-        <p:txBody>
-          <a:bodyPr rtlCol="0" anchor="ctr"/>
-          <a:lstStyle/>
-          <a:p>
-            <a:pPr algn="ctr"/>
-            <a:endParaRPr lang="en-US"/>
-          </a:p>
-        </p:txBody>
-      </p:sp>
-      <p:sp>
-        <p:nvSpPr>
-          <p:cNvPr id="16" name="TextBox 15"/>
-          <p:cNvSpPr txBox="1"/>
-          <p:nvPr/>
-        </p:nvSpPr>
-        <p:spPr>
-          <a:xfrm>
-            <a:off x="7853510" y="3863003"/>
-            <a:ext cx="755015" cy="369332"/>
-          </a:xfrm>
-          <a:prstGeom prst="rect">
-            <a:avLst/>
-          </a:prstGeom>
-          <a:noFill/>
-        </p:spPr>
-        <p:txBody>
-          <a:bodyPr wrap="none" rtlCol="0">
-            <a:spAutoFit/>
-          </a:bodyPr>
-          <a:lstStyle/>
-          <a:p>
-            <a:r>
-              <a:rPr lang="en-US" dirty="0" smtClean="0"/>
-              <a:t>Usage</a:t>
-            </a:r>
-            <a:endParaRPr lang="en-US" dirty="0"/>
-          </a:p>
-        </p:txBody>
-      </p:sp>
-      <p:sp>
-        <p:nvSpPr>
-          <p:cNvPr id="17" name="TextBox 16"/>
-          <p:cNvSpPr txBox="1"/>
-          <p:nvPr/>
-        </p:nvSpPr>
-        <p:spPr>
-          <a:xfrm>
-            <a:off x="6426200" y="1370244"/>
-            <a:ext cx="2652586" cy="369332"/>
-          </a:xfrm>
-          <a:prstGeom prst="rect">
-            <a:avLst/>
-          </a:prstGeom>
-          <a:noFill/>
-        </p:spPr>
-        <p:txBody>
-          <a:bodyPr wrap="none" rtlCol="0">
-            <a:spAutoFit/>
-          </a:bodyPr>
-          <a:lstStyle/>
-          <a:p>
-            <a:r>
-              <a:rPr lang="en-US" dirty="0" smtClean="0">
-                <a:solidFill>
-                  <a:schemeClr val="accent2">
-                    <a:lumMod val="75000"/>
-                  </a:schemeClr>
-                </a:solidFill>
-              </a:rPr>
-              <a:t>Doing what you’re used to</a:t>
-            </a:r>
-            <a:endParaRPr lang="en-US" dirty="0">
-              <a:solidFill>
-                <a:schemeClr val="accent2">
-                  <a:lumMod val="75000"/>
-                </a:schemeClr>
-              </a:solidFill>
-            </a:endParaRPr>
-          </a:p>
-        </p:txBody>
-      </p:sp>
-      <p:sp>
-        <p:nvSpPr>
-          <p:cNvPr id="18" name="TextBox 17"/>
-          <p:cNvSpPr txBox="1"/>
-          <p:nvPr/>
-        </p:nvSpPr>
-        <p:spPr>
-          <a:xfrm>
-            <a:off x="6426200" y="1688865"/>
-            <a:ext cx="2232534" cy="369332"/>
-          </a:xfrm>
-          <a:prstGeom prst="rect">
-            <a:avLst/>
-          </a:prstGeom>
-          <a:noFill/>
-        </p:spPr>
-        <p:txBody>
-          <a:bodyPr wrap="none" rtlCol="0">
-            <a:spAutoFit/>
-          </a:bodyPr>
-          <a:lstStyle/>
-          <a:p>
-            <a:r>
-              <a:rPr lang="en-US" dirty="0" smtClean="0">
-                <a:solidFill>
-                  <a:schemeClr val="accent1">
-                    <a:lumMod val="75000"/>
-                  </a:schemeClr>
-                </a:solidFill>
-              </a:rPr>
-              <a:t>Doing something new</a:t>
-            </a:r>
-            <a:endParaRPr lang="en-US" dirty="0">
-              <a:solidFill>
-                <a:schemeClr val="accent1">
-                  <a:lumMod val="75000"/>
-                </a:schemeClr>
-              </a:solidFill>
-            </a:endParaRPr>
-          </a:p>
-        </p:txBody>
-      </p:sp>
-    </p:spTree>
-    <p:extLst>
-      <p:ext uri="{BB962C8B-B14F-4D97-AF65-F5344CB8AC3E}">
-        <p14:creationId xmlns:p14="http://schemas.microsoft.com/office/powerpoint/2010/main" val="375938767"/>
-      </p:ext>
-    </p:extLst>
-  </p:cSld>
-  <p:clrMapOvr>
-    <a:masterClrMapping/>
-  </p:clrMapOvr>
-  <p:timing>
-    <p:tnLst>
-      <p:par>
-        <p:cTn id="1" dur="indefinite" restart="never" nodeType="tmRoot">
-          <p:childTnLst>
-            <p:seq concurrent="1" nextAc="seek">
-              <p:cTn id="2" dur="indefinite" nodeType="mainSeq">
-                <p:childTnLst>
-                  <p:par>
-                    <p:cTn id="3" fill="hold">
-                      <p:stCondLst>
-                        <p:cond delay="indefinite"/>
-                      </p:stCondLst>
-                      <p:childTnLst>
-                        <p:par>
-                          <p:cTn id="4" fill="hold">
-                            <p:stCondLst>
-                              <p:cond delay="0"/>
-                            </p:stCondLst>
-                            <p:childTnLst>
-                              <p:par>
-                                <p:cTn id="5" presetID="1" presetClass="entr" presetSubtype="0" fill="hold" grpId="0" nodeType="clickEffect">
-                                  <p:stCondLst>
-                                    <p:cond delay="0"/>
-                                  </p:stCondLst>
-                                  <p:childTnLst>
-                                    <p:set>
-                                      <p:cBhvr>
-                                        <p:cTn id="6" dur="1" fill="hold">
-                                          <p:stCondLst>
-                                            <p:cond delay="0"/>
-                                          </p:stCondLst>
-                                        </p:cTn>
-                                        <p:tgtEl>
-                                          <p:spTgt spid="13"/>
-                                        </p:tgtEl>
-                                        <p:attrNameLst>
-                                          <p:attrName>style.visibility</p:attrName>
-                                        </p:attrNameLst>
-                                      </p:cBhvr>
-                                      <p:to>
-                                        <p:strVal val="visible"/>
-                                      </p:to>
-                                    </p:set>
-                                  </p:childTnLst>
-                                </p:cTn>
-                              </p:par>
-                              <p:par>
-                                <p:cTn id="7" presetID="1" presetClass="entr" presetSubtype="0" fill="hold" grpId="0" nodeType="withEffect">
-                                  <p:stCondLst>
-                                    <p:cond delay="0"/>
-                                  </p:stCondLst>
-                                  <p:childTnLst>
-                                    <p:set>
-                                      <p:cBhvr>
-                                        <p:cTn id="8" dur="1" fill="hold">
-                                          <p:stCondLst>
-                                            <p:cond delay="0"/>
-                                          </p:stCondLst>
-                                        </p:cTn>
-                                        <p:tgtEl>
-                                          <p:spTgt spid="14"/>
-                                        </p:tgtEl>
-                                        <p:attrNameLst>
-                                          <p:attrName>style.visibility</p:attrName>
-                                        </p:attrNameLst>
-                                      </p:cBhvr>
-                                      <p:to>
-                                        <p:strVal val="visible"/>
-                                      </p:to>
-                                    </p:set>
-                                  </p:childTnLst>
-                                </p:cTn>
-                              </p:par>
-                              <p:par>
-                                <p:cTn id="9" presetID="1" presetClass="entr" presetSubtype="0" fill="hold" grpId="0" nodeType="withEffect">
-                                  <p:stCondLst>
-                                    <p:cond delay="0"/>
-                                  </p:stCondLst>
-                                  <p:childTnLst>
-                                    <p:set>
-                                      <p:cBhvr>
-                                        <p:cTn id="10" dur="1" fill="hold">
-                                          <p:stCondLst>
-                                            <p:cond delay="0"/>
-                                          </p:stCondLst>
-                                        </p:cTn>
-                                        <p:tgtEl>
-                                          <p:spTgt spid="15"/>
-                                        </p:tgtEl>
-                                        <p:attrNameLst>
-                                          <p:attrName>style.visibility</p:attrName>
-                                        </p:attrNameLst>
-                                      </p:cBhvr>
-                                      <p:to>
-                                        <p:strVal val="visible"/>
-                                      </p:to>
-                                    </p:set>
-                                  </p:childTnLst>
-                                </p:cTn>
-                              </p:par>
-                              <p:par>
-                                <p:cTn id="11" presetID="1" presetClass="entr" presetSubtype="0" fill="hold" grpId="0" nodeType="withEffect">
-                                  <p:stCondLst>
-                                    <p:cond delay="0"/>
-                                  </p:stCondLst>
-                                  <p:childTnLst>
-                                    <p:set>
-                                      <p:cBhvr>
-                                        <p:cTn id="12" dur="1" fill="hold">
-                                          <p:stCondLst>
-                                            <p:cond delay="0"/>
-                                          </p:stCondLst>
-                                        </p:cTn>
-                                        <p:tgtEl>
-                                          <p:spTgt spid="16"/>
-                                        </p:tgtEl>
-                                        <p:attrNameLst>
-                                          <p:attrName>style.visibility</p:attrName>
-                                        </p:attrNameLst>
-                                      </p:cBhvr>
-                                      <p:to>
-                                        <p:strVal val="visible"/>
-                                      </p:to>
-                                    </p:set>
-                                  </p:childTnLst>
-                                </p:cTn>
-                              </p:par>
-                            </p:childTnLst>
-                          </p:cTn>
-                        </p:par>
-                      </p:childTnLst>
-                    </p:cTn>
-                  </p:par>
-                </p:childTnLst>
-              </p:cTn>
-              <p:prevCondLst>
-                <p:cond evt="onPrev" delay="0">
-                  <p:tgtEl>
-                    <p:sldTgt/>
-                  </p:tgtEl>
-                </p:cond>
-              </p:prevCondLst>
-              <p:nextCondLst>
-                <p:cond evt="onNext" delay="0">
-                  <p:tgtEl>
-                    <p:sldTgt/>
-                  </p:tgtEl>
-                </p:cond>
-              </p:nextCondLst>
-            </p:seq>
-          </p:childTnLst>
-        </p:cTn>
-      </p:par>
-    </p:tnLst>
-    <p:bldLst>
-      <p:bldP spid="13" grpId="0" animBg="1"/>
-      <p:bldP spid="14" grpId="0"/>
-      <p:bldP spid="15" grpId="0" animBg="1"/>
-      <p:bldP spid="16" grpId="0"/>
-    </p:bldLst>
-  </p:timing>
-</p:sld>
-</file>
-
-<file path=ppt/slides/slide39.xml><?xml version="1.0" encoding="utf-8"?>
-<p:sld xmlns:a="http://schemas.openxmlformats.org/drawingml/2006/main" xmlns:r="http://schemas.openxmlformats.org/officeDocument/2006/relationships" xmlns:p="http://schemas.openxmlformats.org/presentationml/2006/main">
-  <p:cSld>
-    <p:spTree>
-      <p:nvGrpSpPr>
-        <p:cNvPr id="1" name=""/>
-        <p:cNvGrpSpPr/>
-        <p:nvPr/>
-      </p:nvGrpSpPr>
-      <p:grpSpPr>
-        <a:xfrm>
-          <a:off x="0" y="0"/>
-          <a:ext cx="0" cy="0"/>
-          <a:chOff x="0" y="0"/>
-          <a:chExt cx="0" cy="0"/>
-        </a:xfrm>
-      </p:grpSpPr>
-      <p:sp>
-        <p:nvSpPr>
-          <p:cNvPr id="2" name="Title 1"/>
-          <p:cNvSpPr>
-            <a:spLocks noGrp="1"/>
-          </p:cNvSpPr>
-          <p:nvPr>
-            <p:ph type="title"/>
-          </p:nvPr>
-        </p:nvSpPr>
-        <p:spPr/>
-        <p:txBody>
-          <a:bodyPr/>
-          <a:lstStyle/>
-          <a:p>
-            <a:r>
-              <a:rPr lang="en-US" dirty="0" smtClean="0"/>
-              <a:t>Python’s Data Analysis Modules</a:t>
-            </a:r>
-            <a:endParaRPr lang="en-US" dirty="0"/>
-          </a:p>
-        </p:txBody>
-      </p:sp>
-      <p:sp>
-        <p:nvSpPr>
-          <p:cNvPr id="3" name="Content Placeholder 2"/>
-          <p:cNvSpPr>
-            <a:spLocks noGrp="1"/>
-          </p:cNvSpPr>
-          <p:nvPr>
-            <p:ph idx="1"/>
-          </p:nvPr>
-        </p:nvSpPr>
-        <p:spPr/>
-        <p:txBody>
-          <a:bodyPr>
-            <a:normAutofit lnSpcReduction="10000"/>
-          </a:bodyPr>
-          <a:lstStyle/>
-          <a:p>
-            <a:r>
-              <a:rPr lang="en-US" dirty="0" err="1" smtClean="0"/>
-              <a:t>Numpy</a:t>
-            </a:r>
-            <a:endParaRPr lang="en-US" dirty="0" smtClean="0"/>
-          </a:p>
-          <a:p>
-            <a:pPr lvl="1"/>
-            <a:r>
-              <a:rPr lang="en-US" dirty="0" smtClean="0"/>
-              <a:t>Introduced matrix math</a:t>
-            </a:r>
-          </a:p>
-          <a:p>
-            <a:pPr lvl="1"/>
-            <a:r>
-              <a:rPr lang="en-US" dirty="0" smtClean="0">
-                <a:latin typeface="Consolas" panose="020B0609020204030204" pitchFamily="49" charset="0"/>
-              </a:rPr>
-              <a:t>import </a:t>
-            </a:r>
-            <a:r>
-              <a:rPr lang="en-US" dirty="0" err="1" smtClean="0">
-                <a:latin typeface="Consolas" panose="020B0609020204030204" pitchFamily="49" charset="0"/>
-              </a:rPr>
-              <a:t>numpy</a:t>
-            </a:r>
-            <a:r>
-              <a:rPr lang="en-US" dirty="0" smtClean="0">
-                <a:latin typeface="Consolas" panose="020B0609020204030204" pitchFamily="49" charset="0"/>
-              </a:rPr>
-              <a:t> as np</a:t>
-            </a:r>
-          </a:p>
-          <a:p>
-            <a:r>
-              <a:rPr lang="en-US" dirty="0" err="1" smtClean="0"/>
-              <a:t>Matplotlib</a:t>
-            </a:r>
-            <a:endParaRPr lang="en-US" dirty="0" smtClean="0"/>
-          </a:p>
-          <a:p>
-            <a:pPr lvl="1"/>
-            <a:r>
-              <a:rPr lang="en-US" dirty="0" smtClean="0"/>
-              <a:t>Introduced easy 2D plotting, similar to MATLAB</a:t>
-            </a:r>
-          </a:p>
-          <a:p>
-            <a:pPr lvl="1"/>
-            <a:r>
-              <a:rPr lang="en-US" dirty="0">
-                <a:latin typeface="Consolas" panose="020B0609020204030204" pitchFamily="49" charset="0"/>
-              </a:rPr>
-              <a:t>import </a:t>
-            </a:r>
-            <a:r>
-              <a:rPr lang="en-US" dirty="0" err="1">
-                <a:latin typeface="Consolas" panose="020B0609020204030204" pitchFamily="49" charset="0"/>
-              </a:rPr>
-              <a:t>matplotlib.pyplot</a:t>
-            </a:r>
-            <a:r>
-              <a:rPr lang="en-US" dirty="0">
-                <a:latin typeface="Consolas" panose="020B0609020204030204" pitchFamily="49" charset="0"/>
-              </a:rPr>
-              <a:t> as </a:t>
-            </a:r>
-            <a:r>
-              <a:rPr lang="en-US" dirty="0" err="1">
-                <a:latin typeface="Consolas" panose="020B0609020204030204" pitchFamily="49" charset="0"/>
-              </a:rPr>
-              <a:t>plt</a:t>
-            </a:r>
-            <a:endParaRPr lang="en-US" dirty="0">
-              <a:latin typeface="Consolas" panose="020B0609020204030204" pitchFamily="49" charset="0"/>
-            </a:endParaRPr>
-          </a:p>
-          <a:p>
-            <a:r>
-              <a:rPr lang="en-US" dirty="0" smtClean="0"/>
-              <a:t>Pandas</a:t>
-            </a:r>
-          </a:p>
-          <a:p>
-            <a:pPr lvl="1"/>
-            <a:r>
-              <a:rPr lang="en-US" dirty="0" smtClean="0"/>
-              <a:t>Introduced </a:t>
-            </a:r>
-            <a:r>
-              <a:rPr lang="en-US" dirty="0" err="1" smtClean="0"/>
-              <a:t>dataframes</a:t>
-            </a:r>
-            <a:r>
-              <a:rPr lang="en-US" dirty="0" smtClean="0"/>
-              <a:t>, copied from R</a:t>
-            </a:r>
-          </a:p>
-          <a:p>
-            <a:pPr lvl="1"/>
-            <a:r>
-              <a:rPr lang="en-US" dirty="0">
-                <a:latin typeface="Consolas" panose="020B0609020204030204" pitchFamily="49" charset="0"/>
-              </a:rPr>
-              <a:t>import pandas as </a:t>
-            </a:r>
-            <a:r>
-              <a:rPr lang="en-US" dirty="0" err="1" smtClean="0">
-                <a:latin typeface="Consolas" panose="020B0609020204030204" pitchFamily="49" charset="0"/>
-              </a:rPr>
-              <a:t>pd</a:t>
-            </a:r>
-            <a:endParaRPr lang="en-US" dirty="0" smtClean="0">
-              <a:latin typeface="Consolas" panose="020B0609020204030204" pitchFamily="49" charset="0"/>
-            </a:endParaRPr>
-          </a:p>
-          <a:p>
-            <a:r>
-              <a:rPr lang="en-US" dirty="0" smtClean="0"/>
-              <a:t>These modules put Python on the same playing field as R for data analysis</a:t>
-            </a:r>
-            <a:endParaRPr lang="en-US" dirty="0"/>
-          </a:p>
-        </p:txBody>
-      </p:sp>
-      <p:pic>
-        <p:nvPicPr>
-          <p:cNvPr id="3074" name="Picture 2" descr="Image result for panda"/>
-          <p:cNvPicPr>
-            <a:picLocks noChangeAspect="1" noChangeArrowheads="1"/>
-          </p:cNvPicPr>
-          <p:nvPr/>
-        </p:nvPicPr>
-        <p:blipFill>
-          <a:blip r:embed="rId2" cstate="print">
-            <a:extLst>
-              <a:ext uri="{28A0092B-C50C-407E-A947-70E740481C1C}">
-                <a14:useLocalDpi xmlns:a14="http://schemas.microsoft.com/office/drawing/2010/main" val="0"/>
-              </a:ext>
-            </a:extLst>
-          </a:blip>
-          <a:srcRect/>
-          <a:stretch>
-            <a:fillRect/>
-          </a:stretch>
-        </p:blipFill>
-        <p:spPr bwMode="auto">
-          <a:xfrm>
-            <a:off x="7608780" y="2392680"/>
-            <a:ext cx="3984414" cy="2241233"/>
-          </a:xfrm>
-          <a:prstGeom prst="rect">
-            <a:avLst/>
-          </a:prstGeom>
-          <a:noFill/>
-          <a:extLst>
-            <a:ext uri="{909E8E84-426E-40DD-AFC4-6F175D3DCCD1}">
-              <a14:hiddenFill xmlns:a14="http://schemas.microsoft.com/office/drawing/2010/main">
-                <a:solidFill>
-                  <a:srgbClr val="FFFFFF"/>
-                </a:solidFill>
-              </a14:hiddenFill>
-            </a:ext>
-          </a:extLst>
-        </p:spPr>
-      </p:pic>
-    </p:spTree>
-    <p:extLst>
-      <p:ext uri="{BB962C8B-B14F-4D97-AF65-F5344CB8AC3E}">
-        <p14:creationId xmlns:p14="http://schemas.microsoft.com/office/powerpoint/2010/main" val="3833238978"/>
-      </p:ext>
-    </p:extLst>
-  </p:cSld>
-  <p:clrMapOvr>
-    <a:masterClrMapping/>
-  </p:clrMapOvr>
-  <p:timing>
-    <p:tnLst>
-      <p:par>
-        <p:cTn id="1" dur="indefinite" restart="never" nodeType="tmRoot"/>
-      </p:par>
-    </p:tnLst>
-  </p:timing>
-</p:sld>
-</file>
-
 <file path=ppt/slides/slide4.xml><?xml version="1.0" encoding="utf-8"?>
 <p:sld xmlns:a="http://schemas.openxmlformats.org/drawingml/2006/main" xmlns:r="http://schemas.openxmlformats.org/officeDocument/2006/relationships" xmlns:p="http://schemas.openxmlformats.org/presentationml/2006/main">
   <p:cSld>
@@ -15550,156 +12609,6 @@
     <p:extLst>
       <p:ext uri="{BB962C8B-B14F-4D97-AF65-F5344CB8AC3E}">
         <p14:creationId xmlns:p14="http://schemas.microsoft.com/office/powerpoint/2010/main" val="3022489031"/>
-      </p:ext>
-    </p:extLst>
-  </p:cSld>
-  <p:clrMapOvr>
-    <a:masterClrMapping/>
-  </p:clrMapOvr>
-  <p:timing>
-    <p:tnLst>
-      <p:par>
-        <p:cTn id="1" dur="indefinite" restart="never" nodeType="tmRoot"/>
-      </p:par>
-    </p:tnLst>
-  </p:timing>
-</p:sld>
-</file>
-
-<file path=ppt/slides/slide40.xml><?xml version="1.0" encoding="utf-8"?>
-<p:sld xmlns:a="http://schemas.openxmlformats.org/drawingml/2006/main" xmlns:r="http://schemas.openxmlformats.org/officeDocument/2006/relationships" xmlns:p="http://schemas.openxmlformats.org/presentationml/2006/main">
-  <p:cSld>
-    <p:spTree>
-      <p:nvGrpSpPr>
-        <p:cNvPr id="1" name=""/>
-        <p:cNvGrpSpPr/>
-        <p:nvPr/>
-      </p:nvGrpSpPr>
-      <p:grpSpPr>
-        <a:xfrm>
-          <a:off x="0" y="0"/>
-          <a:ext cx="0" cy="0"/>
-          <a:chOff x="0" y="0"/>
-          <a:chExt cx="0" cy="0"/>
-        </a:xfrm>
-      </p:grpSpPr>
-      <p:sp>
-        <p:nvSpPr>
-          <p:cNvPr id="2" name="Title 1"/>
-          <p:cNvSpPr>
-            <a:spLocks noGrp="1"/>
-          </p:cNvSpPr>
-          <p:nvPr>
-            <p:ph type="title"/>
-          </p:nvPr>
-        </p:nvSpPr>
-        <p:spPr/>
-        <p:txBody>
-          <a:bodyPr/>
-          <a:lstStyle/>
-          <a:p>
-            <a:r>
-              <a:rPr lang="en-US" dirty="0" smtClean="0"/>
-              <a:t>Typical Workflow</a:t>
-            </a:r>
-            <a:endParaRPr lang="en-US" dirty="0"/>
-          </a:p>
-        </p:txBody>
-      </p:sp>
-      <p:sp>
-        <p:nvSpPr>
-          <p:cNvPr id="3" name="Content Placeholder 2"/>
-          <p:cNvSpPr>
-            <a:spLocks noGrp="1"/>
-          </p:cNvSpPr>
-          <p:nvPr>
-            <p:ph idx="1"/>
-          </p:nvPr>
-        </p:nvSpPr>
-        <p:spPr/>
-        <p:txBody>
-          <a:bodyPr>
-            <a:normAutofit lnSpcReduction="10000"/>
-          </a:bodyPr>
-          <a:lstStyle/>
-          <a:p>
-            <a:r>
-              <a:rPr lang="en-US" dirty="0" smtClean="0"/>
-              <a:t>Clean up and organize data</a:t>
-            </a:r>
-          </a:p>
-          <a:p>
-            <a:pPr lvl="1"/>
-            <a:r>
-              <a:rPr lang="en-US" dirty="0" smtClean="0"/>
-              <a:t>Excel for irregular data</a:t>
-            </a:r>
-          </a:p>
-          <a:p>
-            <a:r>
-              <a:rPr lang="en-US" dirty="0" smtClean="0"/>
-              <a:t>Import data into Pandas </a:t>
-            </a:r>
-            <a:r>
-              <a:rPr lang="en-US" dirty="0" err="1" smtClean="0"/>
-              <a:t>dataframe</a:t>
-            </a:r>
-            <a:endParaRPr lang="en-US" dirty="0" smtClean="0"/>
-          </a:p>
-          <a:p>
-            <a:r>
-              <a:rPr lang="en-US" dirty="0" smtClean="0"/>
-              <a:t>Do something to the data</a:t>
-            </a:r>
-          </a:p>
-          <a:p>
-            <a:pPr lvl="1"/>
-            <a:r>
-              <a:rPr lang="en-US" dirty="0" smtClean="0"/>
-              <a:t>Analyze</a:t>
-            </a:r>
-          </a:p>
-          <a:p>
-            <a:pPr lvl="1"/>
-            <a:r>
-              <a:rPr lang="en-US" dirty="0" smtClean="0"/>
-              <a:t>Calculate</a:t>
-            </a:r>
-          </a:p>
-          <a:p>
-            <a:pPr lvl="1"/>
-            <a:r>
-              <a:rPr lang="en-US" dirty="0" smtClean="0"/>
-              <a:t>Summarize</a:t>
-            </a:r>
-          </a:p>
-          <a:p>
-            <a:pPr lvl="1"/>
-            <a:r>
-              <a:rPr lang="en-US" dirty="0" smtClean="0"/>
-              <a:t>Visualize</a:t>
-            </a:r>
-            <a:endParaRPr lang="en-US" dirty="0"/>
-          </a:p>
-          <a:p>
-            <a:pPr lvl="1"/>
-            <a:r>
-              <a:rPr lang="en-US" dirty="0" smtClean="0"/>
-              <a:t>Explore</a:t>
-            </a:r>
-          </a:p>
-          <a:p>
-            <a:r>
-              <a:rPr lang="en-US" dirty="0" smtClean="0"/>
-              <a:t>Export data or visualization to text file, Excel, website</a:t>
-            </a:r>
-          </a:p>
-        </p:txBody>
-      </p:sp>
-    </p:spTree>
-    <p:extLst>
-      <p:ext uri="{BB962C8B-B14F-4D97-AF65-F5344CB8AC3E}">
-        <p14:creationId xmlns:p14="http://schemas.microsoft.com/office/powerpoint/2010/main" val="533438240"/>
       </p:ext>
     </p:extLst>
   </p:cSld>
@@ -16340,7 +13249,6 @@
               <a:rPr lang="en-US" dirty="0" smtClean="0"/>
               <a:t>Very flexible – Pro and Con</a:t>
             </a:r>
-            <a:endParaRPr lang="en-US" dirty="0" smtClean="0"/>
           </a:p>
           <a:p>
             <a:r>

</xml_diff>